<commit_message>
Complete hybrid concurrency lecture.
</commit_message>
<xml_diff>
--- a/Lectures/Hybrid Concurrency/Hybrid Concurrency.pptx
+++ b/Lectures/Hybrid Concurrency/Hybrid Concurrency.pptx
@@ -5,7 +5,7 @@
     <p:sldMasterId id="2147483660" r:id="rId1"/>
   </p:sldMasterIdLst>
   <p:notesMasterIdLst>
-    <p:notesMasterId r:id="rId10"/>
+    <p:notesMasterId r:id="rId22"/>
   </p:notesMasterIdLst>
   <p:sldIdLst>
     <p:sldId id="256" r:id="rId2"/>
@@ -16,6 +16,18 @@
     <p:sldId id="261" r:id="rId7"/>
     <p:sldId id="263" r:id="rId8"/>
     <p:sldId id="262" r:id="rId9"/>
+    <p:sldId id="264" r:id="rId10"/>
+    <p:sldId id="265" r:id="rId11"/>
+    <p:sldId id="266" r:id="rId12"/>
+    <p:sldId id="267" r:id="rId13"/>
+    <p:sldId id="268" r:id="rId14"/>
+    <p:sldId id="269" r:id="rId15"/>
+    <p:sldId id="270" r:id="rId16"/>
+    <p:sldId id="271" r:id="rId17"/>
+    <p:sldId id="272" r:id="rId18"/>
+    <p:sldId id="273" r:id="rId19"/>
+    <p:sldId id="274" r:id="rId20"/>
+    <p:sldId id="275" r:id="rId21"/>
   </p:sldIdLst>
   <p:sldSz cx="9144000" cy="6858000" type="screen4x3"/>
   <p:notesSz cx="6858000" cy="9144000"/>
@@ -199,7 +211,7 @@
           <a:p>
             <a:fld id="{DBE0ECA1-3FBF-48AE-AD2A-4439AE745E19}" type="datetimeFigureOut">
               <a:rPr lang="en-US" smtClean="0"/>
-              <a:t>1/12/2014</a:t>
+              <a:t>1/13/2014</a:t>
             </a:fld>
             <a:endParaRPr lang="en-US"/>
           </a:p>
@@ -660,7 +672,7 @@
           <a:p>
             <a:fld id="{9769DED8-28D4-45B9-A00F-7CFE9335FEA6}" type="datetime1">
               <a:rPr lang="en-US" smtClean="0"/>
-              <a:t>1/12/2014</a:t>
+              <a:t>1/13/2014</a:t>
             </a:fld>
             <a:endParaRPr lang="en-US"/>
           </a:p>
@@ -925,7 +937,7 @@
           <a:p>
             <a:fld id="{2DB3D439-1F88-44B4-B5F7-F9BCD4064257}" type="datetime1">
               <a:rPr lang="en-US" smtClean="0"/>
-              <a:t>1/12/2014</a:t>
+              <a:t>1/13/2014</a:t>
             </a:fld>
             <a:endParaRPr lang="en-US"/>
           </a:p>
@@ -1100,7 +1112,7 @@
           <a:p>
             <a:fld id="{99C5638F-6F55-4055-935C-67841BE78C36}" type="datetime1">
               <a:rPr lang="en-US" smtClean="0"/>
-              <a:t>1/12/2014</a:t>
+              <a:t>1/13/2014</a:t>
             </a:fld>
             <a:endParaRPr lang="en-US"/>
           </a:p>
@@ -1265,7 +1277,7 @@
           <a:p>
             <a:fld id="{E6987D90-0C92-4B22-A29D-FED15412CED2}" type="datetime1">
               <a:rPr lang="en-US" smtClean="0"/>
-              <a:t>1/12/2014</a:t>
+              <a:t>1/13/2014</a:t>
             </a:fld>
             <a:endParaRPr lang="en-US"/>
           </a:p>
@@ -1514,7 +1526,7 @@
           <a:p>
             <a:fld id="{DDB67BC4-9554-49E0-BCB3-D1EF965BA0B8}" type="datetime1">
               <a:rPr lang="en-US" smtClean="0"/>
-              <a:t>1/12/2014</a:t>
+              <a:t>1/13/2014</a:t>
             </a:fld>
             <a:endParaRPr lang="en-US"/>
           </a:p>
@@ -1797,7 +1809,7 @@
           <a:p>
             <a:fld id="{EC24D770-803D-4E01-921C-9C100DD8230C}" type="datetime1">
               <a:rPr lang="en-US" smtClean="0"/>
-              <a:t>1/12/2014</a:t>
+              <a:t>1/13/2014</a:t>
             </a:fld>
             <a:endParaRPr lang="en-US"/>
           </a:p>
@@ -2236,7 +2248,7 @@
           <a:p>
             <a:fld id="{356AD44B-78A4-4209-8070-7DCBE2DC4992}" type="datetime1">
               <a:rPr lang="en-US" smtClean="0"/>
-              <a:t>1/12/2014</a:t>
+              <a:t>1/13/2014</a:t>
             </a:fld>
             <a:endParaRPr lang="en-US"/>
           </a:p>
@@ -2349,7 +2361,7 @@
           <a:p>
             <a:fld id="{A993C59A-7CA2-467F-B7F1-9096881A01B8}" type="datetime1">
               <a:rPr lang="en-US" smtClean="0"/>
-              <a:t>1/12/2014</a:t>
+              <a:t>1/13/2014</a:t>
             </a:fld>
             <a:endParaRPr lang="en-US"/>
           </a:p>
@@ -2439,7 +2451,7 @@
           <a:p>
             <a:fld id="{2B6B58D0-2488-434A-8ED1-692E09B85CC5}" type="datetime1">
               <a:rPr lang="en-US" smtClean="0"/>
-              <a:t>1/12/2014</a:t>
+              <a:t>1/13/2014</a:t>
             </a:fld>
             <a:endParaRPr lang="en-US"/>
           </a:p>
@@ -2681,7 +2693,7 @@
           <a:p>
             <a:fld id="{FDB0AFC2-7D64-4F61-A7B7-9932D3305DDA}" type="datetime1">
               <a:rPr lang="en-US" smtClean="0"/>
-              <a:t>1/12/2014</a:t>
+              <a:t>1/13/2014</a:t>
             </a:fld>
             <a:endParaRPr lang="en-US"/>
           </a:p>
@@ -2975,7 +2987,7 @@
           <a:p>
             <a:fld id="{4983D17A-D7B2-4ECE-8A2C-93679B9D177B}" type="datetime1">
               <a:rPr lang="en-US" smtClean="0"/>
-              <a:t>1/12/2014</a:t>
+              <a:t>1/13/2014</a:t>
             </a:fld>
             <a:endParaRPr lang="en-US"/>
           </a:p>
@@ -3269,7 +3281,7 @@
           <a:p>
             <a:fld id="{2A5275F7-419E-4C23-8A3D-2EE5742B2EC9}" type="datetime1">
               <a:rPr lang="en-US" smtClean="0"/>
-              <a:t>1/12/2014</a:t>
+              <a:t>1/13/2014</a:t>
             </a:fld>
             <a:endParaRPr lang="en-US"/>
           </a:p>
@@ -3844,6 +3856,2799 @@
       </p:par>
     </p:tnLst>
   </p:timing>
+</p:sld>
+</file>
+
+<file path=ppt/slides/slide10.xml><?xml version="1.0" encoding="utf-8"?>
+<p:sld xmlns:a="http://schemas.openxmlformats.org/drawingml/2006/main" xmlns:r="http://schemas.openxmlformats.org/officeDocument/2006/relationships" xmlns:p="http://schemas.openxmlformats.org/presentationml/2006/main">
+  <p:cSld>
+    <p:spTree>
+      <p:nvGrpSpPr>
+        <p:cNvPr id="1" name=""/>
+        <p:cNvGrpSpPr/>
+        <p:nvPr/>
+      </p:nvGrpSpPr>
+      <p:grpSpPr>
+        <a:xfrm>
+          <a:off x="0" y="0"/>
+          <a:ext cx="0" cy="0"/>
+          <a:chOff x="0" y="0"/>
+          <a:chExt cx="0" cy="0"/>
+        </a:xfrm>
+      </p:grpSpPr>
+      <p:sp>
+        <p:nvSpPr>
+          <p:cNvPr id="2" name="Title 1"/>
+          <p:cNvSpPr>
+            <a:spLocks noGrp="1"/>
+          </p:cNvSpPr>
+          <p:nvPr>
+            <p:ph type="title"/>
+          </p:nvPr>
+        </p:nvSpPr>
+        <p:spPr/>
+        <p:txBody>
+          <a:bodyPr/>
+          <a:lstStyle/>
+          <a:p>
+            <a:r>
+              <a:rPr lang="en-US" dirty="0" smtClean="0"/>
+              <a:t>Xeon Phi Architecture</a:t>
+            </a:r>
+            <a:endParaRPr lang="en-US" dirty="0"/>
+          </a:p>
+        </p:txBody>
+      </p:sp>
+      <p:sp>
+        <p:nvSpPr>
+          <p:cNvPr id="4" name="Slide Number Placeholder 3"/>
+          <p:cNvSpPr>
+            <a:spLocks noGrp="1"/>
+          </p:cNvSpPr>
+          <p:nvPr>
+            <p:ph type="sldNum" sz="quarter" idx="12"/>
+          </p:nvPr>
+        </p:nvSpPr>
+        <p:spPr/>
+        <p:txBody>
+          <a:bodyPr/>
+          <a:lstStyle/>
+          <a:p>
+            <a:fld id="{6DA12B36-9664-4CB0-8B2E-F4A2F44AE97E}" type="slidenum">
+              <a:rPr lang="en-US" smtClean="0"/>
+              <a:t>10</a:t>
+            </a:fld>
+            <a:endParaRPr lang="en-US"/>
+          </a:p>
+        </p:txBody>
+      </p:sp>
+      <p:pic>
+        <p:nvPicPr>
+          <p:cNvPr id="2050" name="Picture 2"/>
+          <p:cNvPicPr>
+            <a:picLocks noChangeAspect="1" noChangeArrowheads="1"/>
+          </p:cNvPicPr>
+          <p:nvPr/>
+        </p:nvPicPr>
+        <p:blipFill>
+          <a:blip r:embed="rId2">
+            <a:extLst>
+              <a:ext uri="{28A0092B-C50C-407E-A947-70E740481C1C}">
+                <a14:useLocalDpi xmlns:a14="http://schemas.microsoft.com/office/drawing/2010/main" val="0"/>
+              </a:ext>
+            </a:extLst>
+          </a:blip>
+          <a:srcRect/>
+          <a:stretch>
+            <a:fillRect/>
+          </a:stretch>
+        </p:blipFill>
+        <p:spPr bwMode="auto">
+          <a:xfrm>
+            <a:off x="762000" y="1676400"/>
+            <a:ext cx="7433140" cy="4668012"/>
+          </a:xfrm>
+          <a:prstGeom prst="rect">
+            <a:avLst/>
+          </a:prstGeom>
+          <a:noFill/>
+          <a:ln>
+            <a:noFill/>
+          </a:ln>
+          <a:extLst>
+            <a:ext uri="{909E8E84-426E-40DD-AFC4-6F175D3DCCD1}">
+              <a14:hiddenFill xmlns:a14="http://schemas.microsoft.com/office/drawing/2010/main">
+                <a:solidFill>
+                  <a:schemeClr val="accent1"/>
+                </a:solidFill>
+              </a14:hiddenFill>
+            </a:ext>
+            <a:ext uri="{91240B29-F687-4F45-9708-019B960494DF}">
+              <a14:hiddenLine xmlns:a14="http://schemas.microsoft.com/office/drawing/2010/main" w="9525">
+                <a:solidFill>
+                  <a:schemeClr val="tx1"/>
+                </a:solidFill>
+                <a:miter lim="800000"/>
+                <a:headEnd/>
+                <a:tailEnd/>
+              </a14:hiddenLine>
+            </a:ext>
+          </a:extLst>
+        </p:spPr>
+      </p:pic>
+      <p:sp>
+        <p:nvSpPr>
+          <p:cNvPr id="7" name="Footer Placeholder 6"/>
+          <p:cNvSpPr>
+            <a:spLocks noGrp="1"/>
+          </p:cNvSpPr>
+          <p:nvPr>
+            <p:ph type="ftr" sz="quarter" idx="11"/>
+          </p:nvPr>
+        </p:nvSpPr>
+        <p:spPr/>
+        <p:txBody>
+          <a:bodyPr/>
+          <a:lstStyle/>
+          <a:p>
+            <a:r>
+              <a:rPr lang="en-US" dirty="0"/>
+              <a:t>Source: </a:t>
+            </a:r>
+            <a:r>
+              <a:rPr lang="en-US" dirty="0">
+                <a:hlinkClick r:id="rId3"/>
+              </a:rPr>
+              <a:t>Intel</a:t>
+            </a:r>
+            <a:endParaRPr lang="en-US" dirty="0"/>
+          </a:p>
+        </p:txBody>
+      </p:sp>
+    </p:spTree>
+    <p:extLst>
+      <p:ext uri="{BB962C8B-B14F-4D97-AF65-F5344CB8AC3E}">
+        <p14:creationId xmlns:p14="http://schemas.microsoft.com/office/powerpoint/2010/main" val="3786292205"/>
+      </p:ext>
+    </p:extLst>
+  </p:cSld>
+  <p:clrMapOvr>
+    <a:masterClrMapping/>
+  </p:clrMapOvr>
+</p:sld>
+</file>
+
+<file path=ppt/slides/slide11.xml><?xml version="1.0" encoding="utf-8"?>
+<p:sld xmlns:a="http://schemas.openxmlformats.org/drawingml/2006/main" xmlns:r="http://schemas.openxmlformats.org/officeDocument/2006/relationships" xmlns:p="http://schemas.openxmlformats.org/presentationml/2006/main">
+  <p:cSld>
+    <p:spTree>
+      <p:nvGrpSpPr>
+        <p:cNvPr id="1" name=""/>
+        <p:cNvGrpSpPr/>
+        <p:nvPr/>
+      </p:nvGrpSpPr>
+      <p:grpSpPr>
+        <a:xfrm>
+          <a:off x="0" y="0"/>
+          <a:ext cx="0" cy="0"/>
+          <a:chOff x="0" y="0"/>
+          <a:chExt cx="0" cy="0"/>
+        </a:xfrm>
+      </p:grpSpPr>
+      <p:sp>
+        <p:nvSpPr>
+          <p:cNvPr id="2" name="Title 1"/>
+          <p:cNvSpPr>
+            <a:spLocks noGrp="1"/>
+          </p:cNvSpPr>
+          <p:nvPr>
+            <p:ph type="title"/>
+          </p:nvPr>
+        </p:nvSpPr>
+        <p:spPr/>
+        <p:txBody>
+          <a:bodyPr/>
+          <a:lstStyle/>
+          <a:p>
+            <a:r>
+              <a:rPr lang="en-US" dirty="0" smtClean="0"/>
+              <a:t>Individual Core Architecture</a:t>
+            </a:r>
+            <a:endParaRPr lang="en-US" dirty="0"/>
+          </a:p>
+        </p:txBody>
+      </p:sp>
+      <p:sp>
+        <p:nvSpPr>
+          <p:cNvPr id="4" name="Slide Number Placeholder 3"/>
+          <p:cNvSpPr>
+            <a:spLocks noGrp="1"/>
+          </p:cNvSpPr>
+          <p:nvPr>
+            <p:ph type="sldNum" sz="quarter" idx="12"/>
+          </p:nvPr>
+        </p:nvSpPr>
+        <p:spPr/>
+        <p:txBody>
+          <a:bodyPr/>
+          <a:lstStyle/>
+          <a:p>
+            <a:fld id="{6DA12B36-9664-4CB0-8B2E-F4A2F44AE97E}" type="slidenum">
+              <a:rPr lang="en-US" smtClean="0"/>
+              <a:t>11</a:t>
+            </a:fld>
+            <a:endParaRPr lang="en-US"/>
+          </a:p>
+        </p:txBody>
+      </p:sp>
+      <p:pic>
+        <p:nvPicPr>
+          <p:cNvPr id="3074" name="Picture 2"/>
+          <p:cNvPicPr>
+            <a:picLocks noChangeAspect="1" noChangeArrowheads="1"/>
+          </p:cNvPicPr>
+          <p:nvPr/>
+        </p:nvPicPr>
+        <p:blipFill>
+          <a:blip r:embed="rId2">
+            <a:extLst>
+              <a:ext uri="{28A0092B-C50C-407E-A947-70E740481C1C}">
+                <a14:useLocalDpi xmlns:a14="http://schemas.microsoft.com/office/drawing/2010/main" val="0"/>
+              </a:ext>
+            </a:extLst>
+          </a:blip>
+          <a:srcRect/>
+          <a:stretch>
+            <a:fillRect/>
+          </a:stretch>
+        </p:blipFill>
+        <p:spPr bwMode="auto">
+          <a:xfrm>
+            <a:off x="533400" y="1728788"/>
+            <a:ext cx="7951506" cy="4367212"/>
+          </a:xfrm>
+          <a:prstGeom prst="rect">
+            <a:avLst/>
+          </a:prstGeom>
+          <a:noFill/>
+          <a:ln>
+            <a:noFill/>
+          </a:ln>
+          <a:extLst>
+            <a:ext uri="{909E8E84-426E-40DD-AFC4-6F175D3DCCD1}">
+              <a14:hiddenFill xmlns:a14="http://schemas.microsoft.com/office/drawing/2010/main">
+                <a:solidFill>
+                  <a:schemeClr val="accent1"/>
+                </a:solidFill>
+              </a14:hiddenFill>
+            </a:ext>
+            <a:ext uri="{91240B29-F687-4F45-9708-019B960494DF}">
+              <a14:hiddenLine xmlns:a14="http://schemas.microsoft.com/office/drawing/2010/main" w="9525">
+                <a:solidFill>
+                  <a:schemeClr val="tx1"/>
+                </a:solidFill>
+                <a:miter lim="800000"/>
+                <a:headEnd/>
+                <a:tailEnd/>
+              </a14:hiddenLine>
+            </a:ext>
+          </a:extLst>
+        </p:spPr>
+      </p:pic>
+      <p:sp>
+        <p:nvSpPr>
+          <p:cNvPr id="5" name="Footer Placeholder 4"/>
+          <p:cNvSpPr>
+            <a:spLocks noGrp="1"/>
+          </p:cNvSpPr>
+          <p:nvPr>
+            <p:ph type="ftr" sz="quarter" idx="11"/>
+          </p:nvPr>
+        </p:nvSpPr>
+        <p:spPr/>
+        <p:txBody>
+          <a:bodyPr/>
+          <a:lstStyle/>
+          <a:p>
+            <a:r>
+              <a:rPr lang="en-US" dirty="0"/>
+              <a:t>Source: </a:t>
+            </a:r>
+            <a:r>
+              <a:rPr lang="en-US" dirty="0">
+                <a:hlinkClick r:id="rId3"/>
+              </a:rPr>
+              <a:t>Intel</a:t>
+            </a:r>
+            <a:endParaRPr lang="en-US" dirty="0"/>
+          </a:p>
+        </p:txBody>
+      </p:sp>
+    </p:spTree>
+    <p:extLst>
+      <p:ext uri="{BB962C8B-B14F-4D97-AF65-F5344CB8AC3E}">
+        <p14:creationId xmlns:p14="http://schemas.microsoft.com/office/powerpoint/2010/main" val="2433174994"/>
+      </p:ext>
+    </p:extLst>
+  </p:cSld>
+  <p:clrMapOvr>
+    <a:masterClrMapping/>
+  </p:clrMapOvr>
+</p:sld>
+</file>
+
+<file path=ppt/slides/slide12.xml><?xml version="1.0" encoding="utf-8"?>
+<p:sld xmlns:a="http://schemas.openxmlformats.org/drawingml/2006/main" xmlns:r="http://schemas.openxmlformats.org/officeDocument/2006/relationships" xmlns:p="http://schemas.openxmlformats.org/presentationml/2006/main">
+  <p:cSld>
+    <p:spTree>
+      <p:nvGrpSpPr>
+        <p:cNvPr id="1" name=""/>
+        <p:cNvGrpSpPr/>
+        <p:nvPr/>
+      </p:nvGrpSpPr>
+      <p:grpSpPr>
+        <a:xfrm>
+          <a:off x="0" y="0"/>
+          <a:ext cx="0" cy="0"/>
+          <a:chOff x="0" y="0"/>
+          <a:chExt cx="0" cy="0"/>
+        </a:xfrm>
+      </p:grpSpPr>
+      <p:sp>
+        <p:nvSpPr>
+          <p:cNvPr id="2" name="Title 1"/>
+          <p:cNvSpPr>
+            <a:spLocks noGrp="1"/>
+          </p:cNvSpPr>
+          <p:nvPr>
+            <p:ph type="title"/>
+          </p:nvPr>
+        </p:nvSpPr>
+        <p:spPr/>
+        <p:txBody>
+          <a:bodyPr/>
+          <a:lstStyle/>
+          <a:p>
+            <a:r>
+              <a:rPr lang="en-US" dirty="0" smtClean="0"/>
+              <a:t>Vector Processing Unit</a:t>
+            </a:r>
+            <a:endParaRPr lang="en-US" dirty="0"/>
+          </a:p>
+        </p:txBody>
+      </p:sp>
+      <p:sp>
+        <p:nvSpPr>
+          <p:cNvPr id="4" name="Slide Number Placeholder 3"/>
+          <p:cNvSpPr>
+            <a:spLocks noGrp="1"/>
+          </p:cNvSpPr>
+          <p:nvPr>
+            <p:ph type="sldNum" sz="quarter" idx="12"/>
+          </p:nvPr>
+        </p:nvSpPr>
+        <p:spPr/>
+        <p:txBody>
+          <a:bodyPr/>
+          <a:lstStyle/>
+          <a:p>
+            <a:fld id="{6DA12B36-9664-4CB0-8B2E-F4A2F44AE97E}" type="slidenum">
+              <a:rPr lang="en-US" smtClean="0"/>
+              <a:t>12</a:t>
+            </a:fld>
+            <a:endParaRPr lang="en-US"/>
+          </a:p>
+        </p:txBody>
+      </p:sp>
+      <p:pic>
+        <p:nvPicPr>
+          <p:cNvPr id="4098" name="Picture 2"/>
+          <p:cNvPicPr>
+            <a:picLocks noChangeAspect="1" noChangeArrowheads="1"/>
+          </p:cNvPicPr>
+          <p:nvPr/>
+        </p:nvPicPr>
+        <p:blipFill>
+          <a:blip r:embed="rId2">
+            <a:extLst>
+              <a:ext uri="{28A0092B-C50C-407E-A947-70E740481C1C}">
+                <a14:useLocalDpi xmlns:a14="http://schemas.microsoft.com/office/drawing/2010/main" val="0"/>
+              </a:ext>
+            </a:extLst>
+          </a:blip>
+          <a:srcRect/>
+          <a:stretch>
+            <a:fillRect/>
+          </a:stretch>
+        </p:blipFill>
+        <p:spPr bwMode="auto">
+          <a:xfrm>
+            <a:off x="92869" y="1676400"/>
+            <a:ext cx="8822531" cy="4343400"/>
+          </a:xfrm>
+          <a:prstGeom prst="rect">
+            <a:avLst/>
+          </a:prstGeom>
+          <a:noFill/>
+          <a:ln>
+            <a:noFill/>
+          </a:ln>
+          <a:extLst>
+            <a:ext uri="{909E8E84-426E-40DD-AFC4-6F175D3DCCD1}">
+              <a14:hiddenFill xmlns:a14="http://schemas.microsoft.com/office/drawing/2010/main">
+                <a:solidFill>
+                  <a:schemeClr val="accent1"/>
+                </a:solidFill>
+              </a14:hiddenFill>
+            </a:ext>
+            <a:ext uri="{91240B29-F687-4F45-9708-019B960494DF}">
+              <a14:hiddenLine xmlns:a14="http://schemas.microsoft.com/office/drawing/2010/main" w="9525">
+                <a:solidFill>
+                  <a:schemeClr val="tx1"/>
+                </a:solidFill>
+                <a:miter lim="800000"/>
+                <a:headEnd/>
+                <a:tailEnd/>
+              </a14:hiddenLine>
+            </a:ext>
+          </a:extLst>
+        </p:spPr>
+      </p:pic>
+      <p:sp>
+        <p:nvSpPr>
+          <p:cNvPr id="5" name="Footer Placeholder 4"/>
+          <p:cNvSpPr>
+            <a:spLocks noGrp="1"/>
+          </p:cNvSpPr>
+          <p:nvPr>
+            <p:ph type="ftr" sz="quarter" idx="11"/>
+          </p:nvPr>
+        </p:nvSpPr>
+        <p:spPr/>
+        <p:txBody>
+          <a:bodyPr/>
+          <a:lstStyle/>
+          <a:p>
+            <a:r>
+              <a:rPr lang="en-US" dirty="0"/>
+              <a:t>Source: </a:t>
+            </a:r>
+            <a:r>
+              <a:rPr lang="en-US" dirty="0">
+                <a:hlinkClick r:id="rId3"/>
+              </a:rPr>
+              <a:t>Intel</a:t>
+            </a:r>
+            <a:endParaRPr lang="en-US" dirty="0"/>
+          </a:p>
+        </p:txBody>
+      </p:sp>
+    </p:spTree>
+    <p:extLst>
+      <p:ext uri="{BB962C8B-B14F-4D97-AF65-F5344CB8AC3E}">
+        <p14:creationId xmlns:p14="http://schemas.microsoft.com/office/powerpoint/2010/main" val="3676249053"/>
+      </p:ext>
+    </p:extLst>
+  </p:cSld>
+  <p:clrMapOvr>
+    <a:masterClrMapping/>
+  </p:clrMapOvr>
+</p:sld>
+</file>
+
+<file path=ppt/slides/slide13.xml><?xml version="1.0" encoding="utf-8"?>
+<p:sld xmlns:a="http://schemas.openxmlformats.org/drawingml/2006/main" xmlns:r="http://schemas.openxmlformats.org/officeDocument/2006/relationships" xmlns:p="http://schemas.openxmlformats.org/presentationml/2006/main">
+  <p:cSld>
+    <p:spTree>
+      <p:nvGrpSpPr>
+        <p:cNvPr id="1" name=""/>
+        <p:cNvGrpSpPr/>
+        <p:nvPr/>
+      </p:nvGrpSpPr>
+      <p:grpSpPr>
+        <a:xfrm>
+          <a:off x="0" y="0"/>
+          <a:ext cx="0" cy="0"/>
+          <a:chOff x="0" y="0"/>
+          <a:chExt cx="0" cy="0"/>
+        </a:xfrm>
+      </p:grpSpPr>
+      <p:sp>
+        <p:nvSpPr>
+          <p:cNvPr id="2" name="Title 1"/>
+          <p:cNvSpPr>
+            <a:spLocks noGrp="1"/>
+          </p:cNvSpPr>
+          <p:nvPr>
+            <p:ph type="title"/>
+          </p:nvPr>
+        </p:nvSpPr>
+        <p:spPr/>
+        <p:txBody>
+          <a:bodyPr/>
+          <a:lstStyle/>
+          <a:p>
+            <a:r>
+              <a:rPr lang="en-US" dirty="0" smtClean="0"/>
+              <a:t>Programming for the Xeon Phi</a:t>
+            </a:r>
+            <a:endParaRPr lang="en-US" dirty="0"/>
+          </a:p>
+        </p:txBody>
+      </p:sp>
+      <p:sp>
+        <p:nvSpPr>
+          <p:cNvPr id="3" name="Content Placeholder 2"/>
+          <p:cNvSpPr>
+            <a:spLocks noGrp="1"/>
+          </p:cNvSpPr>
+          <p:nvPr>
+            <p:ph idx="1"/>
+          </p:nvPr>
+        </p:nvSpPr>
+        <p:spPr/>
+        <p:txBody>
+          <a:bodyPr/>
+          <a:lstStyle/>
+          <a:p>
+            <a:r>
+              <a:rPr lang="en-US" dirty="0" smtClean="0"/>
+              <a:t>Like other GPUs, Xeon Phi supports an offload model.</a:t>
+            </a:r>
+          </a:p>
+          <a:p>
+            <a:pPr marL="800100" lvl="1" indent="-342900"/>
+            <a:r>
+              <a:rPr lang="en-US" dirty="0" smtClean="0"/>
+              <a:t>Using the Intel C++ compiler, special directives can be added to code.</a:t>
+            </a:r>
+          </a:p>
+          <a:p>
+            <a:pPr marL="800100" lvl="1" indent="-342900"/>
+            <a:r>
+              <a:rPr lang="en-US" dirty="0" smtClean="0"/>
+              <a:t>Also supports </a:t>
+            </a:r>
+            <a:r>
+              <a:rPr lang="en-US" i="1" dirty="0" smtClean="0"/>
+              <a:t>native compilation</a:t>
+            </a:r>
+            <a:endParaRPr lang="en-US" dirty="0" smtClean="0"/>
+          </a:p>
+          <a:p>
+            <a:pPr marL="1485900" lvl="2" indent="-342900"/>
+            <a:r>
+              <a:rPr lang="en-US" dirty="0" smtClean="0"/>
+              <a:t>Compile an entire executable to run only on the Xeon Phi</a:t>
+            </a:r>
+          </a:p>
+          <a:p>
+            <a:pPr marL="1485900" lvl="2" indent="-342900"/>
+            <a:r>
+              <a:rPr lang="en-US" dirty="0" smtClean="0"/>
+              <a:t>No special directives</a:t>
+            </a:r>
+          </a:p>
+          <a:p>
+            <a:pPr marL="1485900" lvl="2" indent="-342900"/>
+            <a:r>
+              <a:rPr lang="en-US" dirty="0" smtClean="0"/>
+              <a:t>Concurrency support for</a:t>
+            </a:r>
+          </a:p>
+          <a:p>
+            <a:pPr marL="1943100" lvl="3" indent="-342900"/>
+            <a:r>
+              <a:rPr lang="en-US" dirty="0" smtClean="0"/>
+              <a:t>Intel MPI</a:t>
+            </a:r>
+          </a:p>
+          <a:p>
+            <a:pPr marL="1943100" lvl="3" indent="-342900"/>
+            <a:r>
+              <a:rPr lang="en-US" dirty="0" smtClean="0"/>
+              <a:t>Open MP</a:t>
+            </a:r>
+          </a:p>
+          <a:p>
+            <a:pPr marL="1943100" lvl="3" indent="-342900"/>
+            <a:r>
+              <a:rPr lang="en-US" dirty="0" smtClean="0"/>
+              <a:t>Intel </a:t>
+            </a:r>
+            <a:r>
+              <a:rPr lang="en-US" dirty="0" err="1" smtClean="0"/>
+              <a:t>Cilk</a:t>
+            </a:r>
+            <a:r>
+              <a:rPr lang="en-US" dirty="0" smtClean="0"/>
+              <a:t> Plus extensions</a:t>
+            </a:r>
+          </a:p>
+          <a:p>
+            <a:pPr marL="1943100" lvl="3" indent="-342900"/>
+            <a:r>
+              <a:rPr lang="en-US" dirty="0" smtClean="0"/>
+              <a:t>Intel Threading Build Blocks</a:t>
+            </a:r>
+          </a:p>
+          <a:p>
+            <a:pPr marL="800100" lvl="1" indent="-342900"/>
+            <a:r>
+              <a:rPr lang="en-US" dirty="0" smtClean="0"/>
+              <a:t>Let’s look at an example</a:t>
+            </a:r>
+            <a:endParaRPr lang="en-US" dirty="0"/>
+          </a:p>
+        </p:txBody>
+      </p:sp>
+      <p:sp>
+        <p:nvSpPr>
+          <p:cNvPr id="4" name="Slide Number Placeholder 3"/>
+          <p:cNvSpPr>
+            <a:spLocks noGrp="1"/>
+          </p:cNvSpPr>
+          <p:nvPr>
+            <p:ph type="sldNum" sz="quarter" idx="12"/>
+          </p:nvPr>
+        </p:nvSpPr>
+        <p:spPr/>
+        <p:txBody>
+          <a:bodyPr/>
+          <a:lstStyle/>
+          <a:p>
+            <a:fld id="{6DA12B36-9664-4CB0-8B2E-F4A2F44AE97E}" type="slidenum">
+              <a:rPr lang="en-US" smtClean="0"/>
+              <a:t>13</a:t>
+            </a:fld>
+            <a:endParaRPr lang="en-US"/>
+          </a:p>
+        </p:txBody>
+      </p:sp>
+    </p:spTree>
+    <p:extLst>
+      <p:ext uri="{BB962C8B-B14F-4D97-AF65-F5344CB8AC3E}">
+        <p14:creationId xmlns:p14="http://schemas.microsoft.com/office/powerpoint/2010/main" val="2722109450"/>
+      </p:ext>
+    </p:extLst>
+  </p:cSld>
+  <p:clrMapOvr>
+    <a:masterClrMapping/>
+  </p:clrMapOvr>
+</p:sld>
+</file>
+
+<file path=ppt/slides/slide14.xml><?xml version="1.0" encoding="utf-8"?>
+<p:sld xmlns:a="http://schemas.openxmlformats.org/drawingml/2006/main" xmlns:r="http://schemas.openxmlformats.org/officeDocument/2006/relationships" xmlns:p="http://schemas.openxmlformats.org/presentationml/2006/main">
+  <p:cSld>
+    <p:spTree>
+      <p:nvGrpSpPr>
+        <p:cNvPr id="1" name=""/>
+        <p:cNvGrpSpPr/>
+        <p:nvPr/>
+      </p:nvGrpSpPr>
+      <p:grpSpPr>
+        <a:xfrm>
+          <a:off x="0" y="0"/>
+          <a:ext cx="0" cy="0"/>
+          <a:chOff x="0" y="0"/>
+          <a:chExt cx="0" cy="0"/>
+        </a:xfrm>
+      </p:grpSpPr>
+      <p:sp>
+        <p:nvSpPr>
+          <p:cNvPr id="2" name="Title 1"/>
+          <p:cNvSpPr>
+            <a:spLocks noGrp="1"/>
+          </p:cNvSpPr>
+          <p:nvPr>
+            <p:ph type="title"/>
+          </p:nvPr>
+        </p:nvSpPr>
+        <p:spPr/>
+        <p:txBody>
+          <a:bodyPr/>
+          <a:lstStyle/>
+          <a:p>
+            <a:r>
+              <a:rPr lang="en-US" dirty="0" smtClean="0"/>
+              <a:t>Digression: Nash solutions</a:t>
+            </a:r>
+            <a:endParaRPr lang="en-US" dirty="0"/>
+          </a:p>
+        </p:txBody>
+      </p:sp>
+      <p:sp>
+        <p:nvSpPr>
+          <p:cNvPr id="3" name="Content Placeholder 2"/>
+          <p:cNvSpPr>
+            <a:spLocks noGrp="1"/>
+          </p:cNvSpPr>
+          <p:nvPr>
+            <p:ph idx="1"/>
+          </p:nvPr>
+        </p:nvSpPr>
+        <p:spPr/>
+        <p:txBody>
+          <a:bodyPr/>
+          <a:lstStyle/>
+          <a:p>
+            <a:r>
+              <a:rPr lang="en-US" dirty="0" smtClean="0"/>
+              <a:t>The algorithm and we will explore categorizes Nash solutions.</a:t>
+            </a:r>
+          </a:p>
+          <a:p>
+            <a:pPr marL="800100" lvl="1" indent="-342900"/>
+            <a:r>
+              <a:rPr lang="en-US" dirty="0" smtClean="0"/>
+              <a:t>Embarrassingly parallel</a:t>
+            </a:r>
+          </a:p>
+          <a:p>
+            <a:pPr marL="800100" lvl="1" indent="-342900"/>
+            <a:r>
+              <a:rPr lang="en-US" dirty="0" smtClean="0"/>
+              <a:t>Processor-bound</a:t>
+            </a:r>
+          </a:p>
+          <a:p>
+            <a:pPr marL="800100" lvl="1" indent="-342900"/>
+            <a:r>
+              <a:rPr lang="en-US" dirty="0" smtClean="0"/>
+              <a:t>Does not do floating point calculations</a:t>
+            </a:r>
+          </a:p>
+          <a:p>
+            <a:pPr marL="800100" lvl="1" indent="-342900"/>
+            <a:r>
+              <a:rPr lang="en-US" dirty="0" smtClean="0"/>
+              <a:t>Implemented using Threading </a:t>
+            </a:r>
+            <a:r>
+              <a:rPr lang="en-US" dirty="0"/>
+              <a:t>B</a:t>
+            </a:r>
+            <a:r>
+              <a:rPr lang="en-US" dirty="0" smtClean="0"/>
+              <a:t>uilding </a:t>
+            </a:r>
+            <a:r>
+              <a:rPr lang="en-US" dirty="0"/>
+              <a:t>B</a:t>
+            </a:r>
+            <a:r>
+              <a:rPr lang="en-US" dirty="0" smtClean="0"/>
+              <a:t>locks</a:t>
+            </a:r>
+          </a:p>
+          <a:p>
+            <a:pPr marL="800100" lvl="1" indent="-342900"/>
+            <a:endParaRPr lang="en-US" dirty="0"/>
+          </a:p>
+        </p:txBody>
+      </p:sp>
+      <p:sp>
+        <p:nvSpPr>
+          <p:cNvPr id="4" name="Slide Number Placeholder 3"/>
+          <p:cNvSpPr>
+            <a:spLocks noGrp="1"/>
+          </p:cNvSpPr>
+          <p:nvPr>
+            <p:ph type="sldNum" sz="quarter" idx="12"/>
+          </p:nvPr>
+        </p:nvSpPr>
+        <p:spPr/>
+        <p:txBody>
+          <a:bodyPr/>
+          <a:lstStyle/>
+          <a:p>
+            <a:fld id="{6DA12B36-9664-4CB0-8B2E-F4A2F44AE97E}" type="slidenum">
+              <a:rPr lang="en-US" smtClean="0"/>
+              <a:t>14</a:t>
+            </a:fld>
+            <a:endParaRPr lang="en-US"/>
+          </a:p>
+        </p:txBody>
+      </p:sp>
+    </p:spTree>
+    <p:extLst>
+      <p:ext uri="{BB962C8B-B14F-4D97-AF65-F5344CB8AC3E}">
+        <p14:creationId xmlns:p14="http://schemas.microsoft.com/office/powerpoint/2010/main" val="3367586106"/>
+      </p:ext>
+    </p:extLst>
+  </p:cSld>
+  <p:clrMapOvr>
+    <a:masterClrMapping/>
+  </p:clrMapOvr>
+</p:sld>
+</file>
+
+<file path=ppt/slides/slide15.xml><?xml version="1.0" encoding="utf-8"?>
+<p:sld xmlns:a="http://schemas.openxmlformats.org/drawingml/2006/main" xmlns:r="http://schemas.openxmlformats.org/officeDocument/2006/relationships" xmlns:p="http://schemas.openxmlformats.org/presentationml/2006/main">
+  <p:cSld>
+    <p:spTree>
+      <p:nvGrpSpPr>
+        <p:cNvPr id="1" name=""/>
+        <p:cNvGrpSpPr/>
+        <p:nvPr/>
+      </p:nvGrpSpPr>
+      <p:grpSpPr>
+        <a:xfrm>
+          <a:off x="0" y="0"/>
+          <a:ext cx="0" cy="0"/>
+          <a:chOff x="0" y="0"/>
+          <a:chExt cx="0" cy="0"/>
+        </a:xfrm>
+      </p:grpSpPr>
+      <p:sp>
+        <p:nvSpPr>
+          <p:cNvPr id="2" name="Title 1"/>
+          <p:cNvSpPr>
+            <a:spLocks noGrp="1"/>
+          </p:cNvSpPr>
+          <p:nvPr>
+            <p:ph type="title"/>
+          </p:nvPr>
+        </p:nvSpPr>
+        <p:spPr/>
+        <p:txBody>
+          <a:bodyPr/>
+          <a:lstStyle/>
+          <a:p>
+            <a:r>
+              <a:rPr lang="en-US" dirty="0" smtClean="0"/>
+              <a:t>Nash algorithm (6x6) on Xeon Data</a:t>
+            </a:r>
+            <a:endParaRPr lang="en-US" dirty="0"/>
+          </a:p>
+        </p:txBody>
+      </p:sp>
+      <p:graphicFrame>
+        <p:nvGraphicFramePr>
+          <p:cNvPr id="8" name="Content Placeholder 7"/>
+          <p:cNvGraphicFramePr>
+            <a:graphicFrameLocks noGrp="1"/>
+          </p:cNvGraphicFramePr>
+          <p:nvPr>
+            <p:ph idx="1"/>
+            <p:extLst>
+              <p:ext uri="{D42A27DB-BD31-4B8C-83A1-F6EECF244321}">
+                <p14:modId xmlns:p14="http://schemas.microsoft.com/office/powerpoint/2010/main" val="1616949080"/>
+              </p:ext>
+            </p:extLst>
+          </p:nvPr>
+        </p:nvGraphicFramePr>
+        <p:xfrm>
+          <a:off x="457200" y="1752600"/>
+          <a:ext cx="7620000" cy="4820920"/>
+        </p:xfrm>
+        <a:graphic>
+          <a:graphicData uri="http://schemas.openxmlformats.org/drawingml/2006/table">
+            <a:tbl>
+              <a:tblPr firstRow="1" bandRow="1">
+                <a:tableStyleId>{5C22544A-7EE6-4342-B048-85BDC9FD1C3A}</a:tableStyleId>
+              </a:tblPr>
+              <a:tblGrid>
+                <a:gridCol w="2540000"/>
+                <a:gridCol w="2540000"/>
+                <a:gridCol w="2540000"/>
+              </a:tblGrid>
+              <a:tr h="370840">
+                <a:tc>
+                  <a:txBody>
+                    <a:bodyPr/>
+                    <a:lstStyle/>
+                    <a:p>
+                      <a:pPr algn="l" rtl="0" fontAlgn="b"/>
+                      <a:r>
+                        <a:rPr lang="en-US" dirty="0">
+                          <a:solidFill>
+                            <a:srgbClr val="000000"/>
+                          </a:solidFill>
+                          <a:effectLst/>
+                        </a:rPr>
+                        <a:t>Number of Threads</a:t>
+                      </a:r>
+                    </a:p>
+                  </a:txBody>
+                  <a:tcPr marL="28575" marR="28575" marT="0" marB="0" anchor="b"/>
+                </a:tc>
+                <a:tc>
+                  <a:txBody>
+                    <a:bodyPr/>
+                    <a:lstStyle/>
+                    <a:p>
+                      <a:pPr algn="l" rtl="0" fontAlgn="b"/>
+                      <a:r>
+                        <a:rPr lang="en-US">
+                          <a:solidFill>
+                            <a:srgbClr val="000000"/>
+                          </a:solidFill>
+                          <a:effectLst/>
+                        </a:rPr>
+                        <a:t>Actual Run Time</a:t>
+                      </a:r>
+                    </a:p>
+                  </a:txBody>
+                  <a:tcPr marL="28575" marR="28575" marT="0" marB="0" anchor="b"/>
+                </a:tc>
+                <a:tc>
+                  <a:txBody>
+                    <a:bodyPr/>
+                    <a:lstStyle/>
+                    <a:p>
+                      <a:pPr algn="l" rtl="0" fontAlgn="b"/>
+                      <a:r>
+                        <a:rPr lang="en-US" dirty="0">
+                          <a:solidFill>
+                            <a:srgbClr val="000000"/>
+                          </a:solidFill>
+                          <a:effectLst/>
+                        </a:rPr>
+                        <a:t>Linear </a:t>
+                      </a:r>
+                      <a:r>
+                        <a:rPr lang="en-US" dirty="0" smtClean="0">
+                          <a:solidFill>
+                            <a:srgbClr val="000000"/>
+                          </a:solidFill>
+                          <a:effectLst/>
+                        </a:rPr>
+                        <a:t>Scalability</a:t>
+                      </a:r>
+                      <a:endParaRPr lang="en-US" dirty="0">
+                        <a:solidFill>
+                          <a:srgbClr val="000000"/>
+                        </a:solidFill>
+                        <a:effectLst/>
+                      </a:endParaRPr>
+                    </a:p>
+                  </a:txBody>
+                  <a:tcPr marL="28575" marR="28575" marT="0" marB="0" anchor="b"/>
+                </a:tc>
+              </a:tr>
+              <a:tr h="370840">
+                <a:tc>
+                  <a:txBody>
+                    <a:bodyPr/>
+                    <a:lstStyle/>
+                    <a:p>
+                      <a:pPr algn="r" rtl="0" fontAlgn="b"/>
+                      <a:r>
+                        <a:rPr lang="en-US">
+                          <a:solidFill>
+                            <a:srgbClr val="000000"/>
+                          </a:solidFill>
+                          <a:effectLst/>
+                        </a:rPr>
+                        <a:t>1</a:t>
+                      </a:r>
+                    </a:p>
+                  </a:txBody>
+                  <a:tcPr marL="28575" marR="28575" marT="0" marB="0" anchor="b"/>
+                </a:tc>
+                <a:tc>
+                  <a:txBody>
+                    <a:bodyPr/>
+                    <a:lstStyle/>
+                    <a:p>
+                      <a:pPr algn="r" rtl="0" fontAlgn="b"/>
+                      <a:r>
+                        <a:rPr lang="en-US">
+                          <a:solidFill>
+                            <a:srgbClr val="000000"/>
+                          </a:solidFill>
+                          <a:effectLst/>
+                        </a:rPr>
+                        <a:t>668.07</a:t>
+                      </a:r>
+                    </a:p>
+                  </a:txBody>
+                  <a:tcPr marL="28575" marR="28575" marT="0" marB="0" anchor="b"/>
+                </a:tc>
+                <a:tc>
+                  <a:txBody>
+                    <a:bodyPr/>
+                    <a:lstStyle/>
+                    <a:p>
+                      <a:pPr algn="r" rtl="0" fontAlgn="b"/>
+                      <a:r>
+                        <a:rPr lang="en-US">
+                          <a:solidFill>
+                            <a:srgbClr val="000000"/>
+                          </a:solidFill>
+                          <a:effectLst/>
+                        </a:rPr>
+                        <a:t>668.07</a:t>
+                      </a:r>
+                    </a:p>
+                  </a:txBody>
+                  <a:tcPr marL="28575" marR="28575" marT="0" marB="0" anchor="b"/>
+                </a:tc>
+              </a:tr>
+              <a:tr h="370840">
+                <a:tc>
+                  <a:txBody>
+                    <a:bodyPr/>
+                    <a:lstStyle/>
+                    <a:p>
+                      <a:pPr algn="r" rtl="0" fontAlgn="b"/>
+                      <a:r>
+                        <a:rPr lang="en-US">
+                          <a:solidFill>
+                            <a:srgbClr val="000000"/>
+                          </a:solidFill>
+                          <a:effectLst/>
+                        </a:rPr>
+                        <a:t>2</a:t>
+                      </a:r>
+                    </a:p>
+                  </a:txBody>
+                  <a:tcPr marL="28575" marR="28575" marT="0" marB="0" anchor="b"/>
+                </a:tc>
+                <a:tc>
+                  <a:txBody>
+                    <a:bodyPr/>
+                    <a:lstStyle/>
+                    <a:p>
+                      <a:pPr algn="r" rtl="0" fontAlgn="b"/>
+                      <a:r>
+                        <a:rPr lang="en-US">
+                          <a:solidFill>
+                            <a:srgbClr val="000000"/>
+                          </a:solidFill>
+                          <a:effectLst/>
+                        </a:rPr>
+                        <a:t>341.61</a:t>
+                      </a:r>
+                    </a:p>
+                  </a:txBody>
+                  <a:tcPr marL="28575" marR="28575" marT="0" marB="0" anchor="b"/>
+                </a:tc>
+                <a:tc>
+                  <a:txBody>
+                    <a:bodyPr/>
+                    <a:lstStyle/>
+                    <a:p>
+                      <a:pPr algn="r" rtl="0" fontAlgn="b"/>
+                      <a:r>
+                        <a:rPr lang="en-US">
+                          <a:solidFill>
+                            <a:srgbClr val="000000"/>
+                          </a:solidFill>
+                          <a:effectLst/>
+                        </a:rPr>
+                        <a:t>334.04</a:t>
+                      </a:r>
+                    </a:p>
+                  </a:txBody>
+                  <a:tcPr marL="28575" marR="28575" marT="0" marB="0" anchor="b"/>
+                </a:tc>
+              </a:tr>
+              <a:tr h="370840">
+                <a:tc>
+                  <a:txBody>
+                    <a:bodyPr/>
+                    <a:lstStyle/>
+                    <a:p>
+                      <a:pPr algn="r" rtl="0" fontAlgn="b"/>
+                      <a:r>
+                        <a:rPr lang="en-US">
+                          <a:solidFill>
+                            <a:srgbClr val="000000"/>
+                          </a:solidFill>
+                          <a:effectLst/>
+                        </a:rPr>
+                        <a:t>3</a:t>
+                      </a:r>
+                    </a:p>
+                  </a:txBody>
+                  <a:tcPr marL="28575" marR="28575" marT="0" marB="0" anchor="b"/>
+                </a:tc>
+                <a:tc>
+                  <a:txBody>
+                    <a:bodyPr/>
+                    <a:lstStyle/>
+                    <a:p>
+                      <a:pPr algn="r" rtl="0" fontAlgn="b"/>
+                      <a:r>
+                        <a:rPr lang="en-US">
+                          <a:solidFill>
+                            <a:srgbClr val="000000"/>
+                          </a:solidFill>
+                          <a:effectLst/>
+                        </a:rPr>
+                        <a:t>232.12</a:t>
+                      </a:r>
+                    </a:p>
+                  </a:txBody>
+                  <a:tcPr marL="28575" marR="28575" marT="0" marB="0" anchor="b"/>
+                </a:tc>
+                <a:tc>
+                  <a:txBody>
+                    <a:bodyPr/>
+                    <a:lstStyle/>
+                    <a:p>
+                      <a:pPr algn="r" rtl="0" fontAlgn="b"/>
+                      <a:r>
+                        <a:rPr lang="en-US">
+                          <a:solidFill>
+                            <a:srgbClr val="000000"/>
+                          </a:solidFill>
+                          <a:effectLst/>
+                        </a:rPr>
+                        <a:t>222.69</a:t>
+                      </a:r>
+                    </a:p>
+                  </a:txBody>
+                  <a:tcPr marL="28575" marR="28575" marT="0" marB="0" anchor="b"/>
+                </a:tc>
+              </a:tr>
+              <a:tr h="370840">
+                <a:tc>
+                  <a:txBody>
+                    <a:bodyPr/>
+                    <a:lstStyle/>
+                    <a:p>
+                      <a:pPr algn="r" rtl="0" fontAlgn="b"/>
+                      <a:r>
+                        <a:rPr lang="en-US">
+                          <a:solidFill>
+                            <a:srgbClr val="000000"/>
+                          </a:solidFill>
+                          <a:effectLst/>
+                        </a:rPr>
+                        <a:t>4</a:t>
+                      </a:r>
+                    </a:p>
+                  </a:txBody>
+                  <a:tcPr marL="28575" marR="28575" marT="0" marB="0" anchor="b"/>
+                </a:tc>
+                <a:tc>
+                  <a:txBody>
+                    <a:bodyPr/>
+                    <a:lstStyle/>
+                    <a:p>
+                      <a:pPr algn="r" rtl="0" fontAlgn="b"/>
+                      <a:r>
+                        <a:rPr lang="en-US">
+                          <a:solidFill>
+                            <a:srgbClr val="000000"/>
+                          </a:solidFill>
+                          <a:effectLst/>
+                        </a:rPr>
+                        <a:t>174.99</a:t>
+                      </a:r>
+                    </a:p>
+                  </a:txBody>
+                  <a:tcPr marL="28575" marR="28575" marT="0" marB="0" anchor="b"/>
+                </a:tc>
+                <a:tc>
+                  <a:txBody>
+                    <a:bodyPr/>
+                    <a:lstStyle/>
+                    <a:p>
+                      <a:pPr algn="r" rtl="0" fontAlgn="b"/>
+                      <a:r>
+                        <a:rPr lang="en-US">
+                          <a:solidFill>
+                            <a:srgbClr val="000000"/>
+                          </a:solidFill>
+                          <a:effectLst/>
+                        </a:rPr>
+                        <a:t>167.02</a:t>
+                      </a:r>
+                    </a:p>
+                  </a:txBody>
+                  <a:tcPr marL="28575" marR="28575" marT="0" marB="0" anchor="b"/>
+                </a:tc>
+              </a:tr>
+              <a:tr h="370840">
+                <a:tc>
+                  <a:txBody>
+                    <a:bodyPr/>
+                    <a:lstStyle/>
+                    <a:p>
+                      <a:pPr algn="r" rtl="0" fontAlgn="b"/>
+                      <a:r>
+                        <a:rPr lang="en-US">
+                          <a:solidFill>
+                            <a:srgbClr val="000000"/>
+                          </a:solidFill>
+                          <a:effectLst/>
+                        </a:rPr>
+                        <a:t>5</a:t>
+                      </a:r>
+                    </a:p>
+                  </a:txBody>
+                  <a:tcPr marL="28575" marR="28575" marT="0" marB="0" anchor="b"/>
+                </a:tc>
+                <a:tc>
+                  <a:txBody>
+                    <a:bodyPr/>
+                    <a:lstStyle/>
+                    <a:p>
+                      <a:pPr algn="r" rtl="0" fontAlgn="b"/>
+                      <a:r>
+                        <a:rPr lang="en-US">
+                          <a:solidFill>
+                            <a:srgbClr val="000000"/>
+                          </a:solidFill>
+                          <a:effectLst/>
+                        </a:rPr>
+                        <a:t>139.35</a:t>
+                      </a:r>
+                    </a:p>
+                  </a:txBody>
+                  <a:tcPr marL="28575" marR="28575" marT="0" marB="0" anchor="b"/>
+                </a:tc>
+                <a:tc>
+                  <a:txBody>
+                    <a:bodyPr/>
+                    <a:lstStyle/>
+                    <a:p>
+                      <a:pPr algn="r" rtl="0" fontAlgn="b"/>
+                      <a:r>
+                        <a:rPr lang="en-US">
+                          <a:solidFill>
+                            <a:srgbClr val="000000"/>
+                          </a:solidFill>
+                          <a:effectLst/>
+                        </a:rPr>
+                        <a:t>133.61</a:t>
+                      </a:r>
+                    </a:p>
+                  </a:txBody>
+                  <a:tcPr marL="28575" marR="28575" marT="0" marB="0" anchor="b"/>
+                </a:tc>
+              </a:tr>
+              <a:tr h="370840">
+                <a:tc>
+                  <a:txBody>
+                    <a:bodyPr/>
+                    <a:lstStyle/>
+                    <a:p>
+                      <a:pPr algn="r" rtl="0" fontAlgn="b"/>
+                      <a:r>
+                        <a:rPr lang="en-US">
+                          <a:solidFill>
+                            <a:srgbClr val="000000"/>
+                          </a:solidFill>
+                          <a:effectLst/>
+                        </a:rPr>
+                        <a:t>6</a:t>
+                      </a:r>
+                    </a:p>
+                  </a:txBody>
+                  <a:tcPr marL="28575" marR="28575" marT="0" marB="0" anchor="b"/>
+                </a:tc>
+                <a:tc>
+                  <a:txBody>
+                    <a:bodyPr/>
+                    <a:lstStyle/>
+                    <a:p>
+                      <a:pPr algn="r" rtl="0" fontAlgn="b"/>
+                      <a:r>
+                        <a:rPr lang="en-US">
+                          <a:solidFill>
+                            <a:srgbClr val="000000"/>
+                          </a:solidFill>
+                          <a:effectLst/>
+                        </a:rPr>
+                        <a:t>116.44</a:t>
+                      </a:r>
+                    </a:p>
+                  </a:txBody>
+                  <a:tcPr marL="28575" marR="28575" marT="0" marB="0" anchor="b"/>
+                </a:tc>
+                <a:tc>
+                  <a:txBody>
+                    <a:bodyPr/>
+                    <a:lstStyle/>
+                    <a:p>
+                      <a:pPr algn="r" rtl="0" fontAlgn="b"/>
+                      <a:r>
+                        <a:rPr lang="en-US">
+                          <a:solidFill>
+                            <a:srgbClr val="000000"/>
+                          </a:solidFill>
+                          <a:effectLst/>
+                        </a:rPr>
+                        <a:t>111.35</a:t>
+                      </a:r>
+                    </a:p>
+                  </a:txBody>
+                  <a:tcPr marL="28575" marR="28575" marT="0" marB="0" anchor="b"/>
+                </a:tc>
+              </a:tr>
+              <a:tr h="370840">
+                <a:tc>
+                  <a:txBody>
+                    <a:bodyPr/>
+                    <a:lstStyle/>
+                    <a:p>
+                      <a:pPr algn="r" rtl="0" fontAlgn="b"/>
+                      <a:r>
+                        <a:rPr lang="en-US">
+                          <a:solidFill>
+                            <a:srgbClr val="000000"/>
+                          </a:solidFill>
+                          <a:effectLst/>
+                        </a:rPr>
+                        <a:t>7</a:t>
+                      </a:r>
+                    </a:p>
+                  </a:txBody>
+                  <a:tcPr marL="28575" marR="28575" marT="0" marB="0" anchor="b"/>
+                </a:tc>
+                <a:tc>
+                  <a:txBody>
+                    <a:bodyPr/>
+                    <a:lstStyle/>
+                    <a:p>
+                      <a:pPr algn="r" rtl="0" fontAlgn="b"/>
+                      <a:r>
+                        <a:rPr lang="en-US">
+                          <a:solidFill>
+                            <a:srgbClr val="000000"/>
+                          </a:solidFill>
+                          <a:effectLst/>
+                        </a:rPr>
+                        <a:t>99.91</a:t>
+                      </a:r>
+                    </a:p>
+                  </a:txBody>
+                  <a:tcPr marL="28575" marR="28575" marT="0" marB="0" anchor="b"/>
+                </a:tc>
+                <a:tc>
+                  <a:txBody>
+                    <a:bodyPr/>
+                    <a:lstStyle/>
+                    <a:p>
+                      <a:pPr algn="r" rtl="0" fontAlgn="b"/>
+                      <a:r>
+                        <a:rPr lang="en-US">
+                          <a:solidFill>
+                            <a:srgbClr val="000000"/>
+                          </a:solidFill>
+                          <a:effectLst/>
+                        </a:rPr>
+                        <a:t>95.44</a:t>
+                      </a:r>
+                    </a:p>
+                  </a:txBody>
+                  <a:tcPr marL="28575" marR="28575" marT="0" marB="0" anchor="b"/>
+                </a:tc>
+              </a:tr>
+              <a:tr h="370840">
+                <a:tc>
+                  <a:txBody>
+                    <a:bodyPr/>
+                    <a:lstStyle/>
+                    <a:p>
+                      <a:pPr algn="r" rtl="0" fontAlgn="b"/>
+                      <a:r>
+                        <a:rPr lang="en-US">
+                          <a:solidFill>
+                            <a:srgbClr val="000000"/>
+                          </a:solidFill>
+                          <a:effectLst/>
+                        </a:rPr>
+                        <a:t>8</a:t>
+                      </a:r>
+                    </a:p>
+                  </a:txBody>
+                  <a:tcPr marL="28575" marR="28575" marT="0" marB="0" anchor="b"/>
+                </a:tc>
+                <a:tc>
+                  <a:txBody>
+                    <a:bodyPr/>
+                    <a:lstStyle/>
+                    <a:p>
+                      <a:pPr algn="r" rtl="0" fontAlgn="b"/>
+                      <a:r>
+                        <a:rPr lang="en-US">
+                          <a:solidFill>
+                            <a:srgbClr val="000000"/>
+                          </a:solidFill>
+                          <a:effectLst/>
+                        </a:rPr>
+                        <a:t>87.43</a:t>
+                      </a:r>
+                    </a:p>
+                  </a:txBody>
+                  <a:tcPr marL="28575" marR="28575" marT="0" marB="0" anchor="b"/>
+                </a:tc>
+                <a:tc>
+                  <a:txBody>
+                    <a:bodyPr/>
+                    <a:lstStyle/>
+                    <a:p>
+                      <a:pPr algn="r" rtl="0" fontAlgn="b"/>
+                      <a:r>
+                        <a:rPr lang="en-US">
+                          <a:solidFill>
+                            <a:srgbClr val="000000"/>
+                          </a:solidFill>
+                          <a:effectLst/>
+                        </a:rPr>
+                        <a:t>83.51</a:t>
+                      </a:r>
+                    </a:p>
+                  </a:txBody>
+                  <a:tcPr marL="28575" marR="28575" marT="0" marB="0" anchor="b"/>
+                </a:tc>
+              </a:tr>
+              <a:tr h="370840">
+                <a:tc>
+                  <a:txBody>
+                    <a:bodyPr/>
+                    <a:lstStyle/>
+                    <a:p>
+                      <a:pPr algn="r" rtl="0" fontAlgn="b"/>
+                      <a:r>
+                        <a:rPr lang="en-US">
+                          <a:solidFill>
+                            <a:srgbClr val="000000"/>
+                          </a:solidFill>
+                          <a:effectLst/>
+                        </a:rPr>
+                        <a:t>9</a:t>
+                      </a:r>
+                    </a:p>
+                  </a:txBody>
+                  <a:tcPr marL="28575" marR="28575" marT="0" marB="0" anchor="b"/>
+                </a:tc>
+                <a:tc>
+                  <a:txBody>
+                    <a:bodyPr/>
+                    <a:lstStyle/>
+                    <a:p>
+                      <a:pPr algn="r" rtl="0" fontAlgn="b"/>
+                      <a:r>
+                        <a:rPr lang="en-US">
+                          <a:solidFill>
+                            <a:srgbClr val="000000"/>
+                          </a:solidFill>
+                          <a:effectLst/>
+                        </a:rPr>
+                        <a:t>77.79</a:t>
+                      </a:r>
+                    </a:p>
+                  </a:txBody>
+                  <a:tcPr marL="28575" marR="28575" marT="0" marB="0" anchor="b"/>
+                </a:tc>
+                <a:tc>
+                  <a:txBody>
+                    <a:bodyPr/>
+                    <a:lstStyle/>
+                    <a:p>
+                      <a:pPr algn="r" rtl="0" fontAlgn="b"/>
+                      <a:r>
+                        <a:rPr lang="en-US">
+                          <a:solidFill>
+                            <a:srgbClr val="000000"/>
+                          </a:solidFill>
+                          <a:effectLst/>
+                        </a:rPr>
+                        <a:t>74.23</a:t>
+                      </a:r>
+                    </a:p>
+                  </a:txBody>
+                  <a:tcPr marL="28575" marR="28575" marT="0" marB="0" anchor="b"/>
+                </a:tc>
+              </a:tr>
+              <a:tr h="370840">
+                <a:tc>
+                  <a:txBody>
+                    <a:bodyPr/>
+                    <a:lstStyle/>
+                    <a:p>
+                      <a:pPr algn="r" rtl="0" fontAlgn="b"/>
+                      <a:r>
+                        <a:rPr lang="en-US">
+                          <a:solidFill>
+                            <a:srgbClr val="000000"/>
+                          </a:solidFill>
+                          <a:effectLst/>
+                        </a:rPr>
+                        <a:t>10</a:t>
+                      </a:r>
+                    </a:p>
+                  </a:txBody>
+                  <a:tcPr marL="28575" marR="28575" marT="0" marB="0" anchor="b"/>
+                </a:tc>
+                <a:tc>
+                  <a:txBody>
+                    <a:bodyPr/>
+                    <a:lstStyle/>
+                    <a:p>
+                      <a:pPr algn="r" rtl="0" fontAlgn="b"/>
+                      <a:r>
+                        <a:rPr lang="en-US">
+                          <a:solidFill>
+                            <a:srgbClr val="000000"/>
+                          </a:solidFill>
+                          <a:effectLst/>
+                        </a:rPr>
+                        <a:t>70.04</a:t>
+                      </a:r>
+                    </a:p>
+                  </a:txBody>
+                  <a:tcPr marL="28575" marR="28575" marT="0" marB="0" anchor="b"/>
+                </a:tc>
+                <a:tc>
+                  <a:txBody>
+                    <a:bodyPr/>
+                    <a:lstStyle/>
+                    <a:p>
+                      <a:pPr algn="r" rtl="0" fontAlgn="b"/>
+                      <a:r>
+                        <a:rPr lang="en-US">
+                          <a:solidFill>
+                            <a:srgbClr val="000000"/>
+                          </a:solidFill>
+                          <a:effectLst/>
+                        </a:rPr>
+                        <a:t>66.81</a:t>
+                      </a:r>
+                    </a:p>
+                  </a:txBody>
+                  <a:tcPr marL="28575" marR="28575" marT="0" marB="0" anchor="b"/>
+                </a:tc>
+              </a:tr>
+              <a:tr h="370840">
+                <a:tc>
+                  <a:txBody>
+                    <a:bodyPr/>
+                    <a:lstStyle/>
+                    <a:p>
+                      <a:pPr algn="r" rtl="0" fontAlgn="b"/>
+                      <a:r>
+                        <a:rPr lang="en-US">
+                          <a:solidFill>
+                            <a:srgbClr val="000000"/>
+                          </a:solidFill>
+                          <a:effectLst/>
+                        </a:rPr>
+                        <a:t>11</a:t>
+                      </a:r>
+                    </a:p>
+                  </a:txBody>
+                  <a:tcPr marL="28575" marR="28575" marT="0" marB="0" anchor="b"/>
+                </a:tc>
+                <a:tc>
+                  <a:txBody>
+                    <a:bodyPr/>
+                    <a:lstStyle/>
+                    <a:p>
+                      <a:pPr algn="r" rtl="0" fontAlgn="b"/>
+                      <a:r>
+                        <a:rPr lang="en-US">
+                          <a:solidFill>
+                            <a:srgbClr val="000000"/>
+                          </a:solidFill>
+                          <a:effectLst/>
+                        </a:rPr>
+                        <a:t>63.47</a:t>
+                      </a:r>
+                    </a:p>
+                  </a:txBody>
+                  <a:tcPr marL="28575" marR="28575" marT="0" marB="0" anchor="b"/>
+                </a:tc>
+                <a:tc>
+                  <a:txBody>
+                    <a:bodyPr/>
+                    <a:lstStyle/>
+                    <a:p>
+                      <a:pPr algn="r" rtl="0" fontAlgn="b"/>
+                      <a:r>
+                        <a:rPr lang="en-US">
+                          <a:solidFill>
+                            <a:srgbClr val="000000"/>
+                          </a:solidFill>
+                          <a:effectLst/>
+                        </a:rPr>
+                        <a:t>60.73</a:t>
+                      </a:r>
+                    </a:p>
+                  </a:txBody>
+                  <a:tcPr marL="28575" marR="28575" marT="0" marB="0" anchor="b"/>
+                </a:tc>
+              </a:tr>
+              <a:tr h="370840">
+                <a:tc>
+                  <a:txBody>
+                    <a:bodyPr/>
+                    <a:lstStyle/>
+                    <a:p>
+                      <a:pPr algn="r" rtl="0" fontAlgn="b"/>
+                      <a:r>
+                        <a:rPr lang="en-US">
+                          <a:solidFill>
+                            <a:srgbClr val="000000"/>
+                          </a:solidFill>
+                          <a:effectLst/>
+                        </a:rPr>
+                        <a:t>12</a:t>
+                      </a:r>
+                    </a:p>
+                  </a:txBody>
+                  <a:tcPr marL="28575" marR="28575" marT="0" marB="0" anchor="b"/>
+                </a:tc>
+                <a:tc>
+                  <a:txBody>
+                    <a:bodyPr/>
+                    <a:lstStyle/>
+                    <a:p>
+                      <a:pPr algn="r" rtl="0" fontAlgn="b"/>
+                      <a:r>
+                        <a:rPr lang="en-US">
+                          <a:solidFill>
+                            <a:srgbClr val="000000"/>
+                          </a:solidFill>
+                          <a:effectLst/>
+                        </a:rPr>
+                        <a:t>58.27</a:t>
+                      </a:r>
+                    </a:p>
+                  </a:txBody>
+                  <a:tcPr marL="28575" marR="28575" marT="0" marB="0" anchor="b"/>
+                </a:tc>
+                <a:tc>
+                  <a:txBody>
+                    <a:bodyPr/>
+                    <a:lstStyle/>
+                    <a:p>
+                      <a:pPr algn="r" rtl="0" fontAlgn="b"/>
+                      <a:r>
+                        <a:rPr lang="en-US" dirty="0">
+                          <a:solidFill>
+                            <a:srgbClr val="000000"/>
+                          </a:solidFill>
+                          <a:effectLst/>
+                        </a:rPr>
+                        <a:t>55.67</a:t>
+                      </a:r>
+                    </a:p>
+                  </a:txBody>
+                  <a:tcPr marL="28575" marR="28575" marT="0" marB="0" anchor="b"/>
+                </a:tc>
+              </a:tr>
+            </a:tbl>
+          </a:graphicData>
+        </a:graphic>
+      </p:graphicFrame>
+      <p:sp>
+        <p:nvSpPr>
+          <p:cNvPr id="4" name="Slide Number Placeholder 3"/>
+          <p:cNvSpPr>
+            <a:spLocks noGrp="1"/>
+          </p:cNvSpPr>
+          <p:nvPr>
+            <p:ph type="sldNum" sz="quarter" idx="12"/>
+          </p:nvPr>
+        </p:nvSpPr>
+        <p:spPr/>
+        <p:txBody>
+          <a:bodyPr/>
+          <a:lstStyle/>
+          <a:p>
+            <a:fld id="{6DA12B36-9664-4CB0-8B2E-F4A2F44AE97E}" type="slidenum">
+              <a:rPr lang="en-US" smtClean="0"/>
+              <a:t>15</a:t>
+            </a:fld>
+            <a:endParaRPr lang="en-US"/>
+          </a:p>
+        </p:txBody>
+      </p:sp>
+    </p:spTree>
+    <p:extLst>
+      <p:ext uri="{BB962C8B-B14F-4D97-AF65-F5344CB8AC3E}">
+        <p14:creationId xmlns:p14="http://schemas.microsoft.com/office/powerpoint/2010/main" val="1070618170"/>
+      </p:ext>
+    </p:extLst>
+  </p:cSld>
+  <p:clrMapOvr>
+    <a:masterClrMapping/>
+  </p:clrMapOvr>
+</p:sld>
+</file>
+
+<file path=ppt/slides/slide16.xml><?xml version="1.0" encoding="utf-8"?>
+<p:sld xmlns:a="http://schemas.openxmlformats.org/drawingml/2006/main" xmlns:r="http://schemas.openxmlformats.org/officeDocument/2006/relationships" xmlns:p="http://schemas.openxmlformats.org/presentationml/2006/main">
+  <p:cSld>
+    <p:spTree>
+      <p:nvGrpSpPr>
+        <p:cNvPr id="1" name=""/>
+        <p:cNvGrpSpPr/>
+        <p:nvPr/>
+      </p:nvGrpSpPr>
+      <p:grpSpPr>
+        <a:xfrm>
+          <a:off x="0" y="0"/>
+          <a:ext cx="0" cy="0"/>
+          <a:chOff x="0" y="0"/>
+          <a:chExt cx="0" cy="0"/>
+        </a:xfrm>
+      </p:grpSpPr>
+      <p:sp>
+        <p:nvSpPr>
+          <p:cNvPr id="2" name="Title 1"/>
+          <p:cNvSpPr>
+            <a:spLocks noGrp="1"/>
+          </p:cNvSpPr>
+          <p:nvPr>
+            <p:ph type="title"/>
+          </p:nvPr>
+        </p:nvSpPr>
+        <p:spPr/>
+        <p:txBody>
+          <a:bodyPr/>
+          <a:lstStyle/>
+          <a:p>
+            <a:r>
+              <a:rPr lang="en-US" dirty="0"/>
+              <a:t>Nash algorithm (6x6) on Xeon</a:t>
+            </a:r>
+          </a:p>
+        </p:txBody>
+      </p:sp>
+      <p:sp>
+        <p:nvSpPr>
+          <p:cNvPr id="4" name="Slide Number Placeholder 3"/>
+          <p:cNvSpPr>
+            <a:spLocks noGrp="1"/>
+          </p:cNvSpPr>
+          <p:nvPr>
+            <p:ph type="sldNum" sz="quarter" idx="12"/>
+          </p:nvPr>
+        </p:nvSpPr>
+        <p:spPr/>
+        <p:txBody>
+          <a:bodyPr/>
+          <a:lstStyle/>
+          <a:p>
+            <a:fld id="{6DA12B36-9664-4CB0-8B2E-F4A2F44AE97E}" type="slidenum">
+              <a:rPr lang="en-US" smtClean="0"/>
+              <a:t>16</a:t>
+            </a:fld>
+            <a:endParaRPr lang="en-US"/>
+          </a:p>
+        </p:txBody>
+      </p:sp>
+      <p:pic>
+        <p:nvPicPr>
+          <p:cNvPr id="6146" name="Picture 2" descr="C:\Users\Josh\Downloads\chart_1.png"/>
+          <p:cNvPicPr>
+            <a:picLocks noChangeAspect="1" noChangeArrowheads="1"/>
+          </p:cNvPicPr>
+          <p:nvPr/>
+        </p:nvPicPr>
+        <p:blipFill>
+          <a:blip r:embed="rId2">
+            <a:extLst>
+              <a:ext uri="{28A0092B-C50C-407E-A947-70E740481C1C}">
+                <a14:useLocalDpi xmlns:a14="http://schemas.microsoft.com/office/drawing/2010/main" val="0"/>
+              </a:ext>
+            </a:extLst>
+          </a:blip>
+          <a:srcRect/>
+          <a:stretch>
+            <a:fillRect/>
+          </a:stretch>
+        </p:blipFill>
+        <p:spPr bwMode="auto">
+          <a:xfrm>
+            <a:off x="304800" y="1447800"/>
+            <a:ext cx="8305800" cy="5135753"/>
+          </a:xfrm>
+          <a:prstGeom prst="rect">
+            <a:avLst/>
+          </a:prstGeom>
+          <a:noFill/>
+          <a:extLst>
+            <a:ext uri="{909E8E84-426E-40DD-AFC4-6F175D3DCCD1}">
+              <a14:hiddenFill xmlns:a14="http://schemas.microsoft.com/office/drawing/2010/main">
+                <a:solidFill>
+                  <a:srgbClr val="FFFFFF"/>
+                </a:solidFill>
+              </a14:hiddenFill>
+            </a:ext>
+          </a:extLst>
+        </p:spPr>
+      </p:pic>
+    </p:spTree>
+    <p:extLst>
+      <p:ext uri="{BB962C8B-B14F-4D97-AF65-F5344CB8AC3E}">
+        <p14:creationId xmlns:p14="http://schemas.microsoft.com/office/powerpoint/2010/main" val="2182042043"/>
+      </p:ext>
+    </p:extLst>
+  </p:cSld>
+  <p:clrMapOvr>
+    <a:masterClrMapping/>
+  </p:clrMapOvr>
+</p:sld>
+</file>
+
+<file path=ppt/slides/slide17.xml><?xml version="1.0" encoding="utf-8"?>
+<p:sld xmlns:a="http://schemas.openxmlformats.org/drawingml/2006/main" xmlns:r="http://schemas.openxmlformats.org/officeDocument/2006/relationships" xmlns:p="http://schemas.openxmlformats.org/presentationml/2006/main">
+  <p:cSld>
+    <p:spTree>
+      <p:nvGrpSpPr>
+        <p:cNvPr id="1" name=""/>
+        <p:cNvGrpSpPr/>
+        <p:nvPr/>
+      </p:nvGrpSpPr>
+      <p:grpSpPr>
+        <a:xfrm>
+          <a:off x="0" y="0"/>
+          <a:ext cx="0" cy="0"/>
+          <a:chOff x="0" y="0"/>
+          <a:chExt cx="0" cy="0"/>
+        </a:xfrm>
+      </p:grpSpPr>
+      <p:sp>
+        <p:nvSpPr>
+          <p:cNvPr id="2" name="Title 1"/>
+          <p:cNvSpPr>
+            <a:spLocks noGrp="1"/>
+          </p:cNvSpPr>
+          <p:nvPr>
+            <p:ph type="title"/>
+          </p:nvPr>
+        </p:nvSpPr>
+        <p:spPr/>
+        <p:txBody>
+          <a:bodyPr>
+            <a:normAutofit fontScale="90000"/>
+          </a:bodyPr>
+          <a:lstStyle/>
+          <a:p>
+            <a:r>
+              <a:rPr lang="en-US" dirty="0" smtClean="0"/>
+              <a:t>Nash algorithm (6x6) on Xeon Phi Data</a:t>
+            </a:r>
+            <a:endParaRPr lang="en-US" dirty="0"/>
+          </a:p>
+        </p:txBody>
+      </p:sp>
+      <p:graphicFrame>
+        <p:nvGraphicFramePr>
+          <p:cNvPr id="8" name="Content Placeholder 7"/>
+          <p:cNvGraphicFramePr>
+            <a:graphicFrameLocks noGrp="1"/>
+          </p:cNvGraphicFramePr>
+          <p:nvPr>
+            <p:ph idx="1"/>
+            <p:extLst>
+              <p:ext uri="{D42A27DB-BD31-4B8C-83A1-F6EECF244321}">
+                <p14:modId xmlns:p14="http://schemas.microsoft.com/office/powerpoint/2010/main" val="506877733"/>
+              </p:ext>
+            </p:extLst>
+          </p:nvPr>
+        </p:nvGraphicFramePr>
+        <p:xfrm>
+          <a:off x="609600" y="2006600"/>
+          <a:ext cx="7620000" cy="3708400"/>
+        </p:xfrm>
+        <a:graphic>
+          <a:graphicData uri="http://schemas.openxmlformats.org/drawingml/2006/table">
+            <a:tbl>
+              <a:tblPr firstRow="1" bandRow="1">
+                <a:tableStyleId>{5C22544A-7EE6-4342-B048-85BDC9FD1C3A}</a:tableStyleId>
+              </a:tblPr>
+              <a:tblGrid>
+                <a:gridCol w="2540000"/>
+                <a:gridCol w="2540000"/>
+                <a:gridCol w="2540000"/>
+              </a:tblGrid>
+              <a:tr h="370840">
+                <a:tc>
+                  <a:txBody>
+                    <a:bodyPr/>
+                    <a:lstStyle/>
+                    <a:p>
+                      <a:pPr algn="l" rtl="0" fontAlgn="b"/>
+                      <a:r>
+                        <a:rPr lang="en-US" dirty="0">
+                          <a:solidFill>
+                            <a:srgbClr val="000000"/>
+                          </a:solidFill>
+                          <a:effectLst/>
+                        </a:rPr>
+                        <a:t>Number of Threads</a:t>
+                      </a:r>
+                    </a:p>
+                  </a:txBody>
+                  <a:tcPr marL="28575" marR="28575" marT="0" marB="0" anchor="b"/>
+                </a:tc>
+                <a:tc>
+                  <a:txBody>
+                    <a:bodyPr/>
+                    <a:lstStyle/>
+                    <a:p>
+                      <a:pPr algn="l" rtl="0" fontAlgn="b"/>
+                      <a:r>
+                        <a:rPr lang="en-US">
+                          <a:solidFill>
+                            <a:srgbClr val="000000"/>
+                          </a:solidFill>
+                          <a:effectLst/>
+                        </a:rPr>
+                        <a:t>Actual Run Time</a:t>
+                      </a:r>
+                    </a:p>
+                  </a:txBody>
+                  <a:tcPr marL="28575" marR="28575" marT="0" marB="0" anchor="b"/>
+                </a:tc>
+                <a:tc>
+                  <a:txBody>
+                    <a:bodyPr/>
+                    <a:lstStyle/>
+                    <a:p>
+                      <a:pPr algn="l" rtl="0" fontAlgn="b"/>
+                      <a:r>
+                        <a:rPr lang="en-US" dirty="0">
+                          <a:solidFill>
+                            <a:srgbClr val="000000"/>
+                          </a:solidFill>
+                          <a:effectLst/>
+                        </a:rPr>
+                        <a:t>Linear </a:t>
+                      </a:r>
+                      <a:r>
+                        <a:rPr lang="en-US" dirty="0" smtClean="0">
+                          <a:solidFill>
+                            <a:srgbClr val="000000"/>
+                          </a:solidFill>
+                          <a:effectLst/>
+                        </a:rPr>
+                        <a:t>Scalability</a:t>
+                      </a:r>
+                      <a:endParaRPr lang="en-US" dirty="0">
+                        <a:solidFill>
+                          <a:srgbClr val="000000"/>
+                        </a:solidFill>
+                        <a:effectLst/>
+                      </a:endParaRPr>
+                    </a:p>
+                  </a:txBody>
+                  <a:tcPr marL="28575" marR="28575" marT="0" marB="0" anchor="b"/>
+                </a:tc>
+              </a:tr>
+              <a:tr h="370840">
+                <a:tc>
+                  <a:txBody>
+                    <a:bodyPr/>
+                    <a:lstStyle/>
+                    <a:p>
+                      <a:pPr algn="r" rtl="0" fontAlgn="b"/>
+                      <a:r>
+                        <a:rPr lang="en-US">
+                          <a:solidFill>
+                            <a:srgbClr val="000000"/>
+                          </a:solidFill>
+                          <a:effectLst/>
+                        </a:rPr>
+                        <a:t>1</a:t>
+                      </a:r>
+                    </a:p>
+                  </a:txBody>
+                  <a:tcPr marL="28575" marR="28575" marT="0" marB="0" anchor="b"/>
+                </a:tc>
+                <a:tc>
+                  <a:txBody>
+                    <a:bodyPr/>
+                    <a:lstStyle/>
+                    <a:p>
+                      <a:pPr algn="r" rtl="0" fontAlgn="b"/>
+                      <a:r>
+                        <a:rPr lang="en-US">
+                          <a:solidFill>
+                            <a:srgbClr val="000000"/>
+                          </a:solidFill>
+                          <a:effectLst/>
+                        </a:rPr>
+                        <a:t>4,177.10</a:t>
+                      </a:r>
+                    </a:p>
+                  </a:txBody>
+                  <a:tcPr marL="28575" marR="28575" marT="0" marB="0" anchor="b"/>
+                </a:tc>
+                <a:tc>
+                  <a:txBody>
+                    <a:bodyPr/>
+                    <a:lstStyle/>
+                    <a:p>
+                      <a:pPr algn="r" rtl="0" fontAlgn="b"/>
+                      <a:r>
+                        <a:rPr lang="en-US">
+                          <a:solidFill>
+                            <a:srgbClr val="000000"/>
+                          </a:solidFill>
+                          <a:effectLst/>
+                        </a:rPr>
+                        <a:t>4,177.10</a:t>
+                      </a:r>
+                    </a:p>
+                  </a:txBody>
+                  <a:tcPr marL="28575" marR="28575" marT="0" marB="0" anchor="b"/>
+                </a:tc>
+              </a:tr>
+              <a:tr h="370840">
+                <a:tc>
+                  <a:txBody>
+                    <a:bodyPr/>
+                    <a:lstStyle/>
+                    <a:p>
+                      <a:pPr algn="r" rtl="0" fontAlgn="b"/>
+                      <a:r>
+                        <a:rPr lang="en-US">
+                          <a:solidFill>
+                            <a:srgbClr val="000000"/>
+                          </a:solidFill>
+                          <a:effectLst/>
+                        </a:rPr>
+                        <a:t>2</a:t>
+                      </a:r>
+                    </a:p>
+                  </a:txBody>
+                  <a:tcPr marL="28575" marR="28575" marT="0" marB="0" anchor="b"/>
+                </a:tc>
+                <a:tc>
+                  <a:txBody>
+                    <a:bodyPr/>
+                    <a:lstStyle/>
+                    <a:p>
+                      <a:pPr algn="r" rtl="0" fontAlgn="b"/>
+                      <a:r>
+                        <a:rPr lang="en-US">
+                          <a:solidFill>
+                            <a:srgbClr val="000000"/>
+                          </a:solidFill>
+                          <a:effectLst/>
+                        </a:rPr>
+                        <a:t>2,111.20</a:t>
+                      </a:r>
+                    </a:p>
+                  </a:txBody>
+                  <a:tcPr marL="28575" marR="28575" marT="0" marB="0" anchor="b"/>
+                </a:tc>
+                <a:tc>
+                  <a:txBody>
+                    <a:bodyPr/>
+                    <a:lstStyle/>
+                    <a:p>
+                      <a:pPr algn="r" rtl="0" fontAlgn="b"/>
+                      <a:r>
+                        <a:rPr lang="en-US">
+                          <a:solidFill>
+                            <a:srgbClr val="000000"/>
+                          </a:solidFill>
+                          <a:effectLst/>
+                        </a:rPr>
+                        <a:t>2,088.55</a:t>
+                      </a:r>
+                    </a:p>
+                  </a:txBody>
+                  <a:tcPr marL="28575" marR="28575" marT="0" marB="0" anchor="b"/>
+                </a:tc>
+              </a:tr>
+              <a:tr h="370840">
+                <a:tc>
+                  <a:txBody>
+                    <a:bodyPr/>
+                    <a:lstStyle/>
+                    <a:p>
+                      <a:pPr algn="r" rtl="0" fontAlgn="b"/>
+                      <a:r>
+                        <a:rPr lang="en-US">
+                          <a:solidFill>
+                            <a:srgbClr val="000000"/>
+                          </a:solidFill>
+                          <a:effectLst/>
+                        </a:rPr>
+                        <a:t>4</a:t>
+                      </a:r>
+                    </a:p>
+                  </a:txBody>
+                  <a:tcPr marL="28575" marR="28575" marT="0" marB="0" anchor="b"/>
+                </a:tc>
+                <a:tc>
+                  <a:txBody>
+                    <a:bodyPr/>
+                    <a:lstStyle/>
+                    <a:p>
+                      <a:pPr algn="r" rtl="0" fontAlgn="b"/>
+                      <a:r>
+                        <a:rPr lang="en-US">
+                          <a:solidFill>
+                            <a:srgbClr val="000000"/>
+                          </a:solidFill>
+                          <a:effectLst/>
+                        </a:rPr>
+                        <a:t>1,053.28</a:t>
+                      </a:r>
+                    </a:p>
+                  </a:txBody>
+                  <a:tcPr marL="28575" marR="28575" marT="0" marB="0" anchor="b"/>
+                </a:tc>
+                <a:tc>
+                  <a:txBody>
+                    <a:bodyPr/>
+                    <a:lstStyle/>
+                    <a:p>
+                      <a:pPr algn="r" rtl="0" fontAlgn="b"/>
+                      <a:r>
+                        <a:rPr lang="en-US">
+                          <a:solidFill>
+                            <a:srgbClr val="000000"/>
+                          </a:solidFill>
+                          <a:effectLst/>
+                        </a:rPr>
+                        <a:t>1,044.27</a:t>
+                      </a:r>
+                    </a:p>
+                  </a:txBody>
+                  <a:tcPr marL="28575" marR="28575" marT="0" marB="0" anchor="b"/>
+                </a:tc>
+              </a:tr>
+              <a:tr h="370840">
+                <a:tc>
+                  <a:txBody>
+                    <a:bodyPr/>
+                    <a:lstStyle/>
+                    <a:p>
+                      <a:pPr algn="r" rtl="0" fontAlgn="b"/>
+                      <a:r>
+                        <a:rPr lang="en-US">
+                          <a:solidFill>
+                            <a:srgbClr val="000000"/>
+                          </a:solidFill>
+                          <a:effectLst/>
+                        </a:rPr>
+                        <a:t>8</a:t>
+                      </a:r>
+                    </a:p>
+                  </a:txBody>
+                  <a:tcPr marL="28575" marR="28575" marT="0" marB="0" anchor="b"/>
+                </a:tc>
+                <a:tc>
+                  <a:txBody>
+                    <a:bodyPr/>
+                    <a:lstStyle/>
+                    <a:p>
+                      <a:pPr algn="r" rtl="0" fontAlgn="b"/>
+                      <a:r>
+                        <a:rPr lang="en-US">
+                          <a:solidFill>
+                            <a:srgbClr val="000000"/>
+                          </a:solidFill>
+                          <a:effectLst/>
+                        </a:rPr>
+                        <a:t>534.01</a:t>
+                      </a:r>
+                    </a:p>
+                  </a:txBody>
+                  <a:tcPr marL="28575" marR="28575" marT="0" marB="0" anchor="b"/>
+                </a:tc>
+                <a:tc>
+                  <a:txBody>
+                    <a:bodyPr/>
+                    <a:lstStyle/>
+                    <a:p>
+                      <a:pPr algn="r" rtl="0" fontAlgn="b"/>
+                      <a:r>
+                        <a:rPr lang="en-US">
+                          <a:solidFill>
+                            <a:srgbClr val="000000"/>
+                          </a:solidFill>
+                          <a:effectLst/>
+                        </a:rPr>
+                        <a:t>522.14</a:t>
+                      </a:r>
+                    </a:p>
+                  </a:txBody>
+                  <a:tcPr marL="28575" marR="28575" marT="0" marB="0" anchor="b"/>
+                </a:tc>
+              </a:tr>
+              <a:tr h="370840">
+                <a:tc>
+                  <a:txBody>
+                    <a:bodyPr/>
+                    <a:lstStyle/>
+                    <a:p>
+                      <a:pPr algn="r" rtl="0" fontAlgn="b"/>
+                      <a:r>
+                        <a:rPr lang="en-US">
+                          <a:solidFill>
+                            <a:srgbClr val="000000"/>
+                          </a:solidFill>
+                          <a:effectLst/>
+                        </a:rPr>
+                        <a:t>16</a:t>
+                      </a:r>
+                    </a:p>
+                  </a:txBody>
+                  <a:tcPr marL="28575" marR="28575" marT="0" marB="0" anchor="b"/>
+                </a:tc>
+                <a:tc>
+                  <a:txBody>
+                    <a:bodyPr/>
+                    <a:lstStyle/>
+                    <a:p>
+                      <a:pPr algn="r" rtl="0" fontAlgn="b"/>
+                      <a:r>
+                        <a:rPr lang="en-US">
+                          <a:solidFill>
+                            <a:srgbClr val="000000"/>
+                          </a:solidFill>
+                          <a:effectLst/>
+                        </a:rPr>
+                        <a:t>267.94</a:t>
+                      </a:r>
+                    </a:p>
+                  </a:txBody>
+                  <a:tcPr marL="28575" marR="28575" marT="0" marB="0" anchor="b"/>
+                </a:tc>
+                <a:tc>
+                  <a:txBody>
+                    <a:bodyPr/>
+                    <a:lstStyle/>
+                    <a:p>
+                      <a:pPr algn="r" rtl="0" fontAlgn="b"/>
+                      <a:r>
+                        <a:rPr lang="en-US">
+                          <a:solidFill>
+                            <a:srgbClr val="000000"/>
+                          </a:solidFill>
+                          <a:effectLst/>
+                        </a:rPr>
+                        <a:t>261.07</a:t>
+                      </a:r>
+                    </a:p>
+                  </a:txBody>
+                  <a:tcPr marL="28575" marR="28575" marT="0" marB="0" anchor="b"/>
+                </a:tc>
+              </a:tr>
+              <a:tr h="370840">
+                <a:tc>
+                  <a:txBody>
+                    <a:bodyPr/>
+                    <a:lstStyle/>
+                    <a:p>
+                      <a:pPr algn="r" rtl="0" fontAlgn="b"/>
+                      <a:r>
+                        <a:rPr lang="en-US">
+                          <a:solidFill>
+                            <a:srgbClr val="000000"/>
+                          </a:solidFill>
+                          <a:effectLst/>
+                        </a:rPr>
+                        <a:t>32</a:t>
+                      </a:r>
+                    </a:p>
+                  </a:txBody>
+                  <a:tcPr marL="28575" marR="28575" marT="0" marB="0" anchor="b"/>
+                </a:tc>
+                <a:tc>
+                  <a:txBody>
+                    <a:bodyPr/>
+                    <a:lstStyle/>
+                    <a:p>
+                      <a:pPr algn="r" rtl="0" fontAlgn="b"/>
+                      <a:r>
+                        <a:rPr lang="en-US">
+                          <a:solidFill>
+                            <a:srgbClr val="000000"/>
+                          </a:solidFill>
+                          <a:effectLst/>
+                        </a:rPr>
+                        <a:t>133.46</a:t>
+                      </a:r>
+                    </a:p>
+                  </a:txBody>
+                  <a:tcPr marL="28575" marR="28575" marT="0" marB="0" anchor="b"/>
+                </a:tc>
+                <a:tc>
+                  <a:txBody>
+                    <a:bodyPr/>
+                    <a:lstStyle/>
+                    <a:p>
+                      <a:pPr algn="r" rtl="0" fontAlgn="b"/>
+                      <a:r>
+                        <a:rPr lang="en-US">
+                          <a:solidFill>
+                            <a:srgbClr val="000000"/>
+                          </a:solidFill>
+                          <a:effectLst/>
+                        </a:rPr>
+                        <a:t>130.53</a:t>
+                      </a:r>
+                    </a:p>
+                  </a:txBody>
+                  <a:tcPr marL="28575" marR="28575" marT="0" marB="0" anchor="b"/>
+                </a:tc>
+              </a:tr>
+              <a:tr h="370840">
+                <a:tc>
+                  <a:txBody>
+                    <a:bodyPr/>
+                    <a:lstStyle/>
+                    <a:p>
+                      <a:pPr algn="r" rtl="0" fontAlgn="b"/>
+                      <a:r>
+                        <a:rPr lang="en-US">
+                          <a:solidFill>
+                            <a:srgbClr val="000000"/>
+                          </a:solidFill>
+                          <a:effectLst/>
+                        </a:rPr>
+                        <a:t>60</a:t>
+                      </a:r>
+                    </a:p>
+                  </a:txBody>
+                  <a:tcPr marL="28575" marR="28575" marT="0" marB="0" anchor="b"/>
+                </a:tc>
+                <a:tc>
+                  <a:txBody>
+                    <a:bodyPr/>
+                    <a:lstStyle/>
+                    <a:p>
+                      <a:pPr algn="r" rtl="0" fontAlgn="b"/>
+                      <a:r>
+                        <a:rPr lang="en-US">
+                          <a:solidFill>
+                            <a:srgbClr val="000000"/>
+                          </a:solidFill>
+                          <a:effectLst/>
+                        </a:rPr>
+                        <a:t>71.45</a:t>
+                      </a:r>
+                    </a:p>
+                  </a:txBody>
+                  <a:tcPr marL="28575" marR="28575" marT="0" marB="0" anchor="b"/>
+                </a:tc>
+                <a:tc>
+                  <a:txBody>
+                    <a:bodyPr/>
+                    <a:lstStyle/>
+                    <a:p>
+                      <a:pPr algn="r" rtl="0" fontAlgn="b"/>
+                      <a:r>
+                        <a:rPr lang="en-US">
+                          <a:solidFill>
+                            <a:srgbClr val="000000"/>
+                          </a:solidFill>
+                          <a:effectLst/>
+                        </a:rPr>
+                        <a:t>69.62</a:t>
+                      </a:r>
+                    </a:p>
+                  </a:txBody>
+                  <a:tcPr marL="28575" marR="28575" marT="0" marB="0" anchor="b"/>
+                </a:tc>
+              </a:tr>
+              <a:tr h="370840">
+                <a:tc>
+                  <a:txBody>
+                    <a:bodyPr/>
+                    <a:lstStyle/>
+                    <a:p>
+                      <a:pPr algn="r" rtl="0" fontAlgn="b"/>
+                      <a:r>
+                        <a:rPr lang="en-US">
+                          <a:solidFill>
+                            <a:srgbClr val="000000"/>
+                          </a:solidFill>
+                          <a:effectLst/>
+                        </a:rPr>
+                        <a:t>120</a:t>
+                      </a:r>
+                    </a:p>
+                  </a:txBody>
+                  <a:tcPr marL="28575" marR="28575" marT="0" marB="0" anchor="b"/>
+                </a:tc>
+                <a:tc>
+                  <a:txBody>
+                    <a:bodyPr/>
+                    <a:lstStyle/>
+                    <a:p>
+                      <a:pPr algn="r" rtl="0" fontAlgn="b"/>
+                      <a:r>
+                        <a:rPr lang="en-US">
+                          <a:solidFill>
+                            <a:srgbClr val="000000"/>
+                          </a:solidFill>
+                          <a:effectLst/>
+                        </a:rPr>
+                        <a:t>50.09</a:t>
+                      </a:r>
+                    </a:p>
+                  </a:txBody>
+                  <a:tcPr marL="28575" marR="28575" marT="0" marB="0" anchor="b"/>
+                </a:tc>
+                <a:tc>
+                  <a:txBody>
+                    <a:bodyPr/>
+                    <a:lstStyle/>
+                    <a:p>
+                      <a:pPr algn="r" rtl="0" fontAlgn="b"/>
+                      <a:r>
+                        <a:rPr lang="en-US">
+                          <a:solidFill>
+                            <a:srgbClr val="000000"/>
+                          </a:solidFill>
+                          <a:effectLst/>
+                        </a:rPr>
+                        <a:t>34.81</a:t>
+                      </a:r>
+                    </a:p>
+                  </a:txBody>
+                  <a:tcPr marL="28575" marR="28575" marT="0" marB="0" anchor="b"/>
+                </a:tc>
+              </a:tr>
+              <a:tr h="370840">
+                <a:tc>
+                  <a:txBody>
+                    <a:bodyPr/>
+                    <a:lstStyle/>
+                    <a:p>
+                      <a:pPr algn="r" rtl="0" fontAlgn="b"/>
+                      <a:r>
+                        <a:rPr lang="en-US">
+                          <a:solidFill>
+                            <a:srgbClr val="000000"/>
+                          </a:solidFill>
+                          <a:effectLst/>
+                        </a:rPr>
+                        <a:t>240</a:t>
+                      </a:r>
+                    </a:p>
+                  </a:txBody>
+                  <a:tcPr marL="28575" marR="28575" marT="0" marB="0" anchor="b"/>
+                </a:tc>
+                <a:tc>
+                  <a:txBody>
+                    <a:bodyPr/>
+                    <a:lstStyle/>
+                    <a:p>
+                      <a:pPr algn="r" rtl="0" fontAlgn="b"/>
+                      <a:r>
+                        <a:rPr lang="en-US">
+                          <a:solidFill>
+                            <a:srgbClr val="000000"/>
+                          </a:solidFill>
+                          <a:effectLst/>
+                        </a:rPr>
+                        <a:t>48.02</a:t>
+                      </a:r>
+                    </a:p>
+                  </a:txBody>
+                  <a:tcPr marL="28575" marR="28575" marT="0" marB="0" anchor="b"/>
+                </a:tc>
+                <a:tc>
+                  <a:txBody>
+                    <a:bodyPr/>
+                    <a:lstStyle/>
+                    <a:p>
+                      <a:pPr algn="r" rtl="0" fontAlgn="b"/>
+                      <a:r>
+                        <a:rPr lang="en-US" dirty="0">
+                          <a:solidFill>
+                            <a:srgbClr val="000000"/>
+                          </a:solidFill>
+                          <a:effectLst/>
+                        </a:rPr>
+                        <a:t>17.40</a:t>
+                      </a:r>
+                    </a:p>
+                  </a:txBody>
+                  <a:tcPr marL="28575" marR="28575" marT="0" marB="0" anchor="b"/>
+                </a:tc>
+              </a:tr>
+            </a:tbl>
+          </a:graphicData>
+        </a:graphic>
+      </p:graphicFrame>
+      <p:sp>
+        <p:nvSpPr>
+          <p:cNvPr id="4" name="Slide Number Placeholder 3"/>
+          <p:cNvSpPr>
+            <a:spLocks noGrp="1"/>
+          </p:cNvSpPr>
+          <p:nvPr>
+            <p:ph type="sldNum" sz="quarter" idx="12"/>
+          </p:nvPr>
+        </p:nvSpPr>
+        <p:spPr/>
+        <p:txBody>
+          <a:bodyPr/>
+          <a:lstStyle/>
+          <a:p>
+            <a:fld id="{6DA12B36-9664-4CB0-8B2E-F4A2F44AE97E}" type="slidenum">
+              <a:rPr lang="en-US" smtClean="0"/>
+              <a:t>17</a:t>
+            </a:fld>
+            <a:endParaRPr lang="en-US"/>
+          </a:p>
+        </p:txBody>
+      </p:sp>
+    </p:spTree>
+    <p:extLst>
+      <p:ext uri="{BB962C8B-B14F-4D97-AF65-F5344CB8AC3E}">
+        <p14:creationId xmlns:p14="http://schemas.microsoft.com/office/powerpoint/2010/main" val="3799769151"/>
+      </p:ext>
+    </p:extLst>
+  </p:cSld>
+  <p:clrMapOvr>
+    <a:masterClrMapping/>
+  </p:clrMapOvr>
+</p:sld>
+</file>
+
+<file path=ppt/slides/slide18.xml><?xml version="1.0" encoding="utf-8"?>
+<p:sld xmlns:a="http://schemas.openxmlformats.org/drawingml/2006/main" xmlns:r="http://schemas.openxmlformats.org/officeDocument/2006/relationships" xmlns:p="http://schemas.openxmlformats.org/presentationml/2006/main">
+  <p:cSld>
+    <p:spTree>
+      <p:nvGrpSpPr>
+        <p:cNvPr id="1" name=""/>
+        <p:cNvGrpSpPr/>
+        <p:nvPr/>
+      </p:nvGrpSpPr>
+      <p:grpSpPr>
+        <a:xfrm>
+          <a:off x="0" y="0"/>
+          <a:ext cx="0" cy="0"/>
+          <a:chOff x="0" y="0"/>
+          <a:chExt cx="0" cy="0"/>
+        </a:xfrm>
+      </p:grpSpPr>
+      <p:sp>
+        <p:nvSpPr>
+          <p:cNvPr id="2" name="Title 1"/>
+          <p:cNvSpPr>
+            <a:spLocks noGrp="1"/>
+          </p:cNvSpPr>
+          <p:nvPr>
+            <p:ph type="title"/>
+          </p:nvPr>
+        </p:nvSpPr>
+        <p:spPr/>
+        <p:txBody>
+          <a:bodyPr/>
+          <a:lstStyle/>
+          <a:p>
+            <a:r>
+              <a:rPr lang="en-US" dirty="0"/>
+              <a:t>Nash algorithm (6x6) on Xeon Phi</a:t>
+            </a:r>
+          </a:p>
+        </p:txBody>
+      </p:sp>
+      <p:sp>
+        <p:nvSpPr>
+          <p:cNvPr id="4" name="Slide Number Placeholder 3"/>
+          <p:cNvSpPr>
+            <a:spLocks noGrp="1"/>
+          </p:cNvSpPr>
+          <p:nvPr>
+            <p:ph type="sldNum" sz="quarter" idx="12"/>
+          </p:nvPr>
+        </p:nvSpPr>
+        <p:spPr/>
+        <p:txBody>
+          <a:bodyPr/>
+          <a:lstStyle/>
+          <a:p>
+            <a:fld id="{6DA12B36-9664-4CB0-8B2E-F4A2F44AE97E}" type="slidenum">
+              <a:rPr lang="en-US" smtClean="0"/>
+              <a:t>18</a:t>
+            </a:fld>
+            <a:endParaRPr lang="en-US"/>
+          </a:p>
+        </p:txBody>
+      </p:sp>
+      <p:pic>
+        <p:nvPicPr>
+          <p:cNvPr id="7170" name="Picture 2" descr="C:\Users\Josh\Downloads\chart_1 (1).png"/>
+          <p:cNvPicPr>
+            <a:picLocks noChangeAspect="1" noChangeArrowheads="1"/>
+          </p:cNvPicPr>
+          <p:nvPr/>
+        </p:nvPicPr>
+        <p:blipFill>
+          <a:blip r:embed="rId2">
+            <a:extLst>
+              <a:ext uri="{28A0092B-C50C-407E-A947-70E740481C1C}">
+                <a14:useLocalDpi xmlns:a14="http://schemas.microsoft.com/office/drawing/2010/main" val="0"/>
+              </a:ext>
+            </a:extLst>
+          </a:blip>
+          <a:srcRect/>
+          <a:stretch>
+            <a:fillRect/>
+          </a:stretch>
+        </p:blipFill>
+        <p:spPr bwMode="auto">
+          <a:xfrm>
+            <a:off x="533400" y="1676400"/>
+            <a:ext cx="7683500" cy="4750964"/>
+          </a:xfrm>
+          <a:prstGeom prst="rect">
+            <a:avLst/>
+          </a:prstGeom>
+          <a:noFill/>
+          <a:extLst>
+            <a:ext uri="{909E8E84-426E-40DD-AFC4-6F175D3DCCD1}">
+              <a14:hiddenFill xmlns:a14="http://schemas.microsoft.com/office/drawing/2010/main">
+                <a:solidFill>
+                  <a:srgbClr val="FFFFFF"/>
+                </a:solidFill>
+              </a14:hiddenFill>
+            </a:ext>
+          </a:extLst>
+        </p:spPr>
+      </p:pic>
+    </p:spTree>
+    <p:extLst>
+      <p:ext uri="{BB962C8B-B14F-4D97-AF65-F5344CB8AC3E}">
+        <p14:creationId xmlns:p14="http://schemas.microsoft.com/office/powerpoint/2010/main" val="1496759632"/>
+      </p:ext>
+    </p:extLst>
+  </p:cSld>
+  <p:clrMapOvr>
+    <a:masterClrMapping/>
+  </p:clrMapOvr>
+</p:sld>
+</file>
+
+<file path=ppt/slides/slide19.xml><?xml version="1.0" encoding="utf-8"?>
+<p:sld xmlns:a="http://schemas.openxmlformats.org/drawingml/2006/main" xmlns:r="http://schemas.openxmlformats.org/officeDocument/2006/relationships" xmlns:p="http://schemas.openxmlformats.org/presentationml/2006/main">
+  <p:cSld>
+    <p:spTree>
+      <p:nvGrpSpPr>
+        <p:cNvPr id="1" name=""/>
+        <p:cNvGrpSpPr/>
+        <p:nvPr/>
+      </p:nvGrpSpPr>
+      <p:grpSpPr>
+        <a:xfrm>
+          <a:off x="0" y="0"/>
+          <a:ext cx="0" cy="0"/>
+          <a:chOff x="0" y="0"/>
+          <a:chExt cx="0" cy="0"/>
+        </a:xfrm>
+      </p:grpSpPr>
+      <p:sp>
+        <p:nvSpPr>
+          <p:cNvPr id="2" name="Title 1"/>
+          <p:cNvSpPr>
+            <a:spLocks noGrp="1"/>
+          </p:cNvSpPr>
+          <p:nvPr>
+            <p:ph type="title"/>
+          </p:nvPr>
+        </p:nvSpPr>
+        <p:spPr/>
+        <p:txBody>
+          <a:bodyPr/>
+          <a:lstStyle/>
+          <a:p>
+            <a:r>
+              <a:rPr lang="en-US" dirty="0" smtClean="0"/>
+              <a:t>Xeon vs Xeon Phi</a:t>
+            </a:r>
+            <a:endParaRPr lang="en-US" dirty="0"/>
+          </a:p>
+        </p:txBody>
+      </p:sp>
+      <p:sp>
+        <p:nvSpPr>
+          <p:cNvPr id="4" name="Slide Number Placeholder 3"/>
+          <p:cNvSpPr>
+            <a:spLocks noGrp="1"/>
+          </p:cNvSpPr>
+          <p:nvPr>
+            <p:ph type="sldNum" sz="quarter" idx="12"/>
+          </p:nvPr>
+        </p:nvSpPr>
+        <p:spPr/>
+        <p:txBody>
+          <a:bodyPr/>
+          <a:lstStyle/>
+          <a:p>
+            <a:fld id="{6DA12B36-9664-4CB0-8B2E-F4A2F44AE97E}" type="slidenum">
+              <a:rPr lang="en-US" smtClean="0"/>
+              <a:t>19</a:t>
+            </a:fld>
+            <a:endParaRPr lang="en-US"/>
+          </a:p>
+        </p:txBody>
+      </p:sp>
+      <p:pic>
+        <p:nvPicPr>
+          <p:cNvPr id="8194" name="Picture 2" descr="C:\Users\Josh\Downloads\chart_2.png"/>
+          <p:cNvPicPr>
+            <a:picLocks noChangeAspect="1" noChangeArrowheads="1"/>
+          </p:cNvPicPr>
+          <p:nvPr/>
+        </p:nvPicPr>
+        <p:blipFill>
+          <a:blip r:embed="rId2">
+            <a:extLst>
+              <a:ext uri="{28A0092B-C50C-407E-A947-70E740481C1C}">
+                <a14:useLocalDpi xmlns:a14="http://schemas.microsoft.com/office/drawing/2010/main" val="0"/>
+              </a:ext>
+            </a:extLst>
+          </a:blip>
+          <a:srcRect/>
+          <a:stretch>
+            <a:fillRect/>
+          </a:stretch>
+        </p:blipFill>
+        <p:spPr bwMode="auto">
+          <a:xfrm>
+            <a:off x="381000" y="1524000"/>
+            <a:ext cx="8077200" cy="4994401"/>
+          </a:xfrm>
+          <a:prstGeom prst="rect">
+            <a:avLst/>
+          </a:prstGeom>
+          <a:noFill/>
+          <a:extLst>
+            <a:ext uri="{909E8E84-426E-40DD-AFC4-6F175D3DCCD1}">
+              <a14:hiddenFill xmlns:a14="http://schemas.microsoft.com/office/drawing/2010/main">
+                <a:solidFill>
+                  <a:srgbClr val="FFFFFF"/>
+                </a:solidFill>
+              </a14:hiddenFill>
+            </a:ext>
+          </a:extLst>
+        </p:spPr>
+      </p:pic>
+      <p:cxnSp>
+        <p:nvCxnSpPr>
+          <p:cNvPr id="6" name="Straight Connector 5"/>
+          <p:cNvCxnSpPr/>
+          <p:nvPr/>
+        </p:nvCxnSpPr>
+        <p:spPr>
+          <a:xfrm>
+            <a:off x="1981200" y="5334000"/>
+            <a:ext cx="5029200" cy="0"/>
+          </a:xfrm>
+          <a:prstGeom prst="line">
+            <a:avLst/>
+          </a:prstGeom>
+        </p:spPr>
+        <p:style>
+          <a:lnRef idx="2">
+            <a:schemeClr val="accent1"/>
+          </a:lnRef>
+          <a:fillRef idx="0">
+            <a:schemeClr val="accent1"/>
+          </a:fillRef>
+          <a:effectRef idx="1">
+            <a:schemeClr val="accent1"/>
+          </a:effectRef>
+          <a:fontRef idx="minor">
+            <a:schemeClr val="tx1"/>
+          </a:fontRef>
+        </p:style>
+      </p:cxnSp>
+    </p:spTree>
+    <p:extLst>
+      <p:ext uri="{BB962C8B-B14F-4D97-AF65-F5344CB8AC3E}">
+        <p14:creationId xmlns:p14="http://schemas.microsoft.com/office/powerpoint/2010/main" val="2077368706"/>
+      </p:ext>
+    </p:extLst>
+  </p:cSld>
+  <p:clrMapOvr>
+    <a:masterClrMapping/>
+  </p:clrMapOvr>
 </p:sld>
 </file>
 
@@ -4516,6 +7321,174 @@
 </p:sld>
 </file>
 
+<file path=ppt/slides/slide20.xml><?xml version="1.0" encoding="utf-8"?>
+<p:sld xmlns:a="http://schemas.openxmlformats.org/drawingml/2006/main" xmlns:r="http://schemas.openxmlformats.org/officeDocument/2006/relationships" xmlns:p="http://schemas.openxmlformats.org/presentationml/2006/main">
+  <p:cSld>
+    <p:spTree>
+      <p:nvGrpSpPr>
+        <p:cNvPr id="1" name=""/>
+        <p:cNvGrpSpPr/>
+        <p:nvPr/>
+      </p:nvGrpSpPr>
+      <p:grpSpPr>
+        <a:xfrm>
+          <a:off x="0" y="0"/>
+          <a:ext cx="0" cy="0"/>
+          <a:chOff x="0" y="0"/>
+          <a:chExt cx="0" cy="0"/>
+        </a:xfrm>
+      </p:grpSpPr>
+      <p:sp>
+        <p:nvSpPr>
+          <p:cNvPr id="2" name="Title 1"/>
+          <p:cNvSpPr>
+            <a:spLocks noGrp="1"/>
+          </p:cNvSpPr>
+          <p:nvPr>
+            <p:ph type="title"/>
+          </p:nvPr>
+        </p:nvSpPr>
+        <p:spPr/>
+        <p:txBody>
+          <a:bodyPr/>
+          <a:lstStyle/>
+          <a:p>
+            <a:r>
+              <a:rPr lang="en-US" dirty="0" smtClean="0"/>
+              <a:t>Why is this occurring?</a:t>
+            </a:r>
+            <a:endParaRPr lang="en-US" dirty="0"/>
+          </a:p>
+        </p:txBody>
+      </p:sp>
+      <p:sp>
+        <p:nvSpPr>
+          <p:cNvPr id="3" name="Content Placeholder 2"/>
+          <p:cNvSpPr>
+            <a:spLocks noGrp="1"/>
+          </p:cNvSpPr>
+          <p:nvPr>
+            <p:ph idx="1"/>
+          </p:nvPr>
+        </p:nvSpPr>
+        <p:spPr/>
+        <p:txBody>
+          <a:bodyPr/>
+          <a:lstStyle/>
+          <a:p>
+            <a:r>
+              <a:rPr lang="en-US" dirty="0" smtClean="0"/>
+              <a:t>Recall the end  of Dennard scaling.</a:t>
+            </a:r>
+          </a:p>
+          <a:p>
+            <a:pPr marL="800100" lvl="1" indent="-342900"/>
+            <a:r>
+              <a:rPr lang="en-US" dirty="0" smtClean="0"/>
+              <a:t>GPUs exhibit </a:t>
+            </a:r>
+            <a:r>
+              <a:rPr lang="en-US" i="1" dirty="0" smtClean="0"/>
+              <a:t>worse</a:t>
+            </a:r>
+            <a:r>
+              <a:rPr lang="en-US" dirty="0" smtClean="0"/>
+              <a:t> performance.</a:t>
+            </a:r>
+          </a:p>
+          <a:p>
+            <a:pPr marL="800100" lvl="1" indent="-342900"/>
+            <a:r>
+              <a:rPr lang="en-US" dirty="0" smtClean="0"/>
+              <a:t>GPUs exhibit </a:t>
+            </a:r>
+            <a:r>
+              <a:rPr lang="en-US" i="1" dirty="0" smtClean="0"/>
+              <a:t>better</a:t>
+            </a:r>
+            <a:r>
+              <a:rPr lang="en-US" dirty="0" smtClean="0"/>
+              <a:t> performance per watt.</a:t>
+            </a:r>
+          </a:p>
+          <a:p>
+            <a:pPr marL="342900" indent="-342900"/>
+            <a:endParaRPr lang="en-US" dirty="0"/>
+          </a:p>
+          <a:p>
+            <a:pPr marL="342900" indent="-342900"/>
+            <a:r>
+              <a:rPr lang="en-US" dirty="0" smtClean="0"/>
+              <a:t>The near future:</a:t>
+            </a:r>
+          </a:p>
+          <a:p>
+            <a:pPr marL="800100" lvl="1" indent="-342900"/>
+            <a:r>
+              <a:rPr lang="en-US" dirty="0" smtClean="0"/>
+              <a:t>More simple, slow GPU cores available</a:t>
+            </a:r>
+          </a:p>
+          <a:p>
+            <a:pPr marL="800100" lvl="1" indent="-342900"/>
+            <a:r>
+              <a:rPr lang="en-US" dirty="0" smtClean="0"/>
+              <a:t>Improvement in GPU cores for general purpose code</a:t>
+            </a:r>
+          </a:p>
+          <a:p>
+            <a:pPr marL="800100" lvl="1" indent="-342900"/>
+            <a:r>
+              <a:rPr lang="en-US" dirty="0" smtClean="0"/>
+              <a:t>Faster connection to GPU cores (for improved offload performance)</a:t>
+            </a:r>
+          </a:p>
+          <a:p>
+            <a:pPr marL="800100" lvl="1" indent="-342900"/>
+            <a:endParaRPr lang="en-US" dirty="0" smtClean="0"/>
+          </a:p>
+          <a:p>
+            <a:pPr marL="800100" lvl="1" indent="-342900"/>
+            <a:endParaRPr lang="en-US" dirty="0"/>
+          </a:p>
+        </p:txBody>
+      </p:sp>
+      <p:sp>
+        <p:nvSpPr>
+          <p:cNvPr id="4" name="Slide Number Placeholder 3"/>
+          <p:cNvSpPr>
+            <a:spLocks noGrp="1"/>
+          </p:cNvSpPr>
+          <p:nvPr>
+            <p:ph type="sldNum" sz="quarter" idx="12"/>
+          </p:nvPr>
+        </p:nvSpPr>
+        <p:spPr/>
+        <p:txBody>
+          <a:bodyPr/>
+          <a:lstStyle/>
+          <a:p>
+            <a:fld id="{6DA12B36-9664-4CB0-8B2E-F4A2F44AE97E}" type="slidenum">
+              <a:rPr lang="en-US" smtClean="0"/>
+              <a:t>20</a:t>
+            </a:fld>
+            <a:endParaRPr lang="en-US"/>
+          </a:p>
+        </p:txBody>
+      </p:sp>
+    </p:spTree>
+    <p:extLst>
+      <p:ext uri="{BB962C8B-B14F-4D97-AF65-F5344CB8AC3E}">
+        <p14:creationId xmlns:p14="http://schemas.microsoft.com/office/powerpoint/2010/main" val="2166875944"/>
+      </p:ext>
+    </p:extLst>
+  </p:cSld>
+  <p:clrMapOvr>
+    <a:masterClrMapping/>
+  </p:clrMapOvr>
+</p:sld>
+</file>
+
 <file path=ppt/slides/slide3.xml><?xml version="1.0" encoding="utf-8"?>
 <p:sld xmlns:a="http://schemas.openxmlformats.org/drawingml/2006/main" xmlns:r="http://schemas.openxmlformats.org/officeDocument/2006/relationships" xmlns:p="http://schemas.openxmlformats.org/presentationml/2006/main">
   <p:cSld>
@@ -4577,11 +7550,7 @@
             </a:r>
             <a:r>
               <a:rPr lang="en-US" dirty="0" smtClean="0"/>
-              <a:t> uses the available hardware resources in the most efficient manner</a:t>
-            </a:r>
-            <a:r>
-              <a:rPr lang="en-US" dirty="0" smtClean="0"/>
-              <a:t>.</a:t>
+              <a:t> uses the available hardware resources in the most efficient manner.</a:t>
             </a:r>
           </a:p>
           <a:p>
@@ -4947,7 +7916,11 @@
             <a:pPr marL="800100" lvl="1" indent="-342900"/>
             <a:r>
               <a:rPr lang="en-US" dirty="0" smtClean="0"/>
-              <a:t>GPU do not execute not x86 or x64 code</a:t>
+              <a:t>GPUs </a:t>
+            </a:r>
+            <a:r>
+              <a:rPr lang="en-US" dirty="0" smtClean="0"/>
+              <a:t>do not execute not x86 or x64 code</a:t>
             </a:r>
           </a:p>
           <a:p>
@@ -5282,15 +8255,15 @@
             <a:pPr marL="800100" lvl="1" indent="-342900"/>
             <a:r>
               <a:rPr lang="en-US" dirty="0" smtClean="0"/>
-              <a:t>Find code that is highly parallel (</a:t>
-            </a:r>
-            <a:r>
-              <a:rPr lang="en-US" dirty="0" err="1" smtClean="0"/>
-              <a:t>Amhadl’s</a:t>
+              <a:t>Find code that is highly parallel </a:t>
             </a:r>
             <a:r>
               <a:rPr lang="en-US" dirty="0" smtClean="0"/>
-              <a:t> Law)</a:t>
+              <a:t>(Amdahl's </a:t>
+            </a:r>
+            <a:r>
+              <a:rPr lang="en-US" dirty="0" smtClean="0"/>
+              <a:t>Law)</a:t>
             </a:r>
           </a:p>
           <a:p>
@@ -8625,8 +11598,13 @@
             <a:pPr marL="1485900" lvl="2" indent="-342900"/>
             <a:r>
               <a:rPr lang="en-US" dirty="0" smtClean="0"/>
-              <a:t>60 general-purpose CPUs</a:t>
-            </a:r>
+              <a:t>60 general-purpose </a:t>
+            </a:r>
+            <a:r>
+              <a:rPr lang="en-US" dirty="0" smtClean="0"/>
+              <a:t>CPUs, four threads per CPU</a:t>
+            </a:r>
+            <a:endParaRPr lang="en-US" dirty="0" smtClean="0"/>
           </a:p>
           <a:p>
             <a:pPr marL="1943100" lvl="3" indent="-342900"/>
@@ -8681,8 +11659,13 @@
             <a:pPr marL="1485900" lvl="2" indent="-342900"/>
             <a:r>
               <a:rPr lang="en-US" dirty="0" smtClean="0"/>
-              <a:t>Can execute Linux binaries compiled for MIC architecture</a:t>
-            </a:r>
+              <a:t>Can execute Linux binaries compiled for MIC </a:t>
+            </a:r>
+            <a:r>
+              <a:rPr lang="en-US" dirty="0" smtClean="0"/>
+              <a:t>architecture</a:t>
+            </a:r>
+            <a:endParaRPr lang="en-US" dirty="0" smtClean="0"/>
           </a:p>
           <a:p>
             <a:pPr marL="1485900" lvl="2" indent="-342900"/>
@@ -8730,6 +11713,165 @@
       </p:par>
     </p:tnLst>
   </p:timing>
+</p:sld>
+</file>
+
+<file path=ppt/slides/slide9.xml><?xml version="1.0" encoding="utf-8"?>
+<p:sld xmlns:a="http://schemas.openxmlformats.org/drawingml/2006/main" xmlns:r="http://schemas.openxmlformats.org/officeDocument/2006/relationships" xmlns:p="http://schemas.openxmlformats.org/presentationml/2006/main">
+  <p:cSld>
+    <p:spTree>
+      <p:nvGrpSpPr>
+        <p:cNvPr id="1" name=""/>
+        <p:cNvGrpSpPr/>
+        <p:nvPr/>
+      </p:nvGrpSpPr>
+      <p:grpSpPr>
+        <a:xfrm>
+          <a:off x="0" y="0"/>
+          <a:ext cx="0" cy="0"/>
+          <a:chOff x="0" y="0"/>
+          <a:chExt cx="0" cy="0"/>
+        </a:xfrm>
+      </p:grpSpPr>
+      <p:sp>
+        <p:nvSpPr>
+          <p:cNvPr id="2" name="Title 1"/>
+          <p:cNvSpPr>
+            <a:spLocks noGrp="1"/>
+          </p:cNvSpPr>
+          <p:nvPr>
+            <p:ph type="title"/>
+          </p:nvPr>
+        </p:nvSpPr>
+        <p:spPr/>
+        <p:txBody>
+          <a:bodyPr/>
+          <a:lstStyle/>
+          <a:p>
+            <a:r>
+              <a:rPr lang="en-US" dirty="0" smtClean="0"/>
+              <a:t>Xeon Phi</a:t>
+            </a:r>
+            <a:endParaRPr lang="en-US" dirty="0"/>
+          </a:p>
+        </p:txBody>
+      </p:sp>
+      <p:sp>
+        <p:nvSpPr>
+          <p:cNvPr id="4" name="Slide Number Placeholder 3"/>
+          <p:cNvSpPr>
+            <a:spLocks noGrp="1"/>
+          </p:cNvSpPr>
+          <p:nvPr>
+            <p:ph type="sldNum" sz="quarter" idx="12"/>
+          </p:nvPr>
+        </p:nvSpPr>
+        <p:spPr/>
+        <p:txBody>
+          <a:bodyPr/>
+          <a:lstStyle/>
+          <a:p>
+            <a:fld id="{6DA12B36-9664-4CB0-8B2E-F4A2F44AE97E}" type="slidenum">
+              <a:rPr lang="en-US" smtClean="0"/>
+              <a:t>9</a:t>
+            </a:fld>
+            <a:endParaRPr lang="en-US"/>
+          </a:p>
+        </p:txBody>
+      </p:sp>
+      <p:pic>
+        <p:nvPicPr>
+          <p:cNvPr id="1026" name="Picture 2"/>
+          <p:cNvPicPr>
+            <a:picLocks noChangeAspect="1" noChangeArrowheads="1"/>
+          </p:cNvPicPr>
+          <p:nvPr/>
+        </p:nvPicPr>
+        <p:blipFill>
+          <a:blip r:embed="rId2">
+            <a:extLst>
+              <a:ext uri="{28A0092B-C50C-407E-A947-70E740481C1C}">
+                <a14:useLocalDpi xmlns:a14="http://schemas.microsoft.com/office/drawing/2010/main" val="0"/>
+              </a:ext>
+            </a:extLst>
+          </a:blip>
+          <a:srcRect/>
+          <a:stretch>
+            <a:fillRect/>
+          </a:stretch>
+        </p:blipFill>
+        <p:spPr bwMode="auto">
+          <a:xfrm>
+            <a:off x="1524000" y="1752600"/>
+            <a:ext cx="5905500" cy="4429125"/>
+          </a:xfrm>
+          <a:prstGeom prst="rect">
+            <a:avLst/>
+          </a:prstGeom>
+          <a:noFill/>
+          <a:ln>
+            <a:noFill/>
+          </a:ln>
+          <a:extLst>
+            <a:ext uri="{909E8E84-426E-40DD-AFC4-6F175D3DCCD1}">
+              <a14:hiddenFill xmlns:a14="http://schemas.microsoft.com/office/drawing/2010/main">
+                <a:solidFill>
+                  <a:schemeClr val="accent1"/>
+                </a:solidFill>
+              </a14:hiddenFill>
+            </a:ext>
+            <a:ext uri="{91240B29-F687-4F45-9708-019B960494DF}">
+              <a14:hiddenLine xmlns:a14="http://schemas.microsoft.com/office/drawing/2010/main" w="9525">
+                <a:solidFill>
+                  <a:schemeClr val="tx1"/>
+                </a:solidFill>
+                <a:miter lim="800000"/>
+                <a:headEnd/>
+                <a:tailEnd/>
+              </a14:hiddenLine>
+            </a:ext>
+          </a:extLst>
+        </p:spPr>
+      </p:pic>
+      <p:sp>
+        <p:nvSpPr>
+          <p:cNvPr id="5" name="Footer Placeholder 4"/>
+          <p:cNvSpPr>
+            <a:spLocks noGrp="1"/>
+          </p:cNvSpPr>
+          <p:nvPr>
+            <p:ph type="ftr" sz="quarter" idx="11"/>
+          </p:nvPr>
+        </p:nvSpPr>
+        <p:spPr/>
+        <p:txBody>
+          <a:bodyPr/>
+          <a:lstStyle/>
+          <a:p>
+            <a:r>
+              <a:rPr lang="en-US" smtClean="0"/>
+              <a:t>Source: </a:t>
+            </a:r>
+            <a:r>
+              <a:rPr lang="en-US" smtClean="0">
+                <a:hlinkClick r:id="rId3"/>
+              </a:rPr>
+              <a:t>IEEE Spectrum</a:t>
+            </a:r>
+            <a:endParaRPr lang="en-US" dirty="0"/>
+          </a:p>
+        </p:txBody>
+      </p:sp>
+    </p:spTree>
+    <p:extLst>
+      <p:ext uri="{BB962C8B-B14F-4D97-AF65-F5344CB8AC3E}">
+        <p14:creationId xmlns:p14="http://schemas.microsoft.com/office/powerpoint/2010/main" val="3761870858"/>
+      </p:ext>
+    </p:extLst>
+  </p:cSld>
+  <p:clrMapOvr>
+    <a:masterClrMapping/>
+  </p:clrMapOvr>
 </p:sld>
 </file>
 

</xml_diff>